<commit_message>
docs: Makduck ppt 수정
</commit_message>
<xml_diff>
--- a/etc/MAKDUCK_suleesulee.pptx
+++ b/etc/MAKDUCK_suleesulee.pptx
@@ -260,7 +260,7 @@
           <a:p>
             <a:fld id="{CB1DAC54-1E96-4A47-B03C-EAEB98ECE396}" type="datetimeFigureOut">
               <a:rPr lang="ko-KR" altLang="en-US" smtClean="0"/>
-              <a:t>2021-09-13</a:t>
+              <a:t>2021-09-14</a:t>
             </a:fld>
             <a:endParaRPr lang="ko-KR" altLang="en-US"/>
           </a:p>
@@ -458,7 +458,7 @@
           <a:p>
             <a:fld id="{CB1DAC54-1E96-4A47-B03C-EAEB98ECE396}" type="datetimeFigureOut">
               <a:rPr lang="ko-KR" altLang="en-US" smtClean="0"/>
-              <a:t>2021-09-13</a:t>
+              <a:t>2021-09-14</a:t>
             </a:fld>
             <a:endParaRPr lang="ko-KR" altLang="en-US"/>
           </a:p>
@@ -666,7 +666,7 @@
           <a:p>
             <a:fld id="{CB1DAC54-1E96-4A47-B03C-EAEB98ECE396}" type="datetimeFigureOut">
               <a:rPr lang="ko-KR" altLang="en-US" smtClean="0"/>
-              <a:t>2021-09-13</a:t>
+              <a:t>2021-09-14</a:t>
             </a:fld>
             <a:endParaRPr lang="ko-KR" altLang="en-US"/>
           </a:p>
@@ -864,7 +864,7 @@
           <a:p>
             <a:fld id="{CB1DAC54-1E96-4A47-B03C-EAEB98ECE396}" type="datetimeFigureOut">
               <a:rPr lang="ko-KR" altLang="en-US" smtClean="0"/>
-              <a:t>2021-09-13</a:t>
+              <a:t>2021-09-14</a:t>
             </a:fld>
             <a:endParaRPr lang="ko-KR" altLang="en-US"/>
           </a:p>
@@ -1139,7 +1139,7 @@
           <a:p>
             <a:fld id="{CB1DAC54-1E96-4A47-B03C-EAEB98ECE396}" type="datetimeFigureOut">
               <a:rPr lang="ko-KR" altLang="en-US" smtClean="0"/>
-              <a:t>2021-09-13</a:t>
+              <a:t>2021-09-14</a:t>
             </a:fld>
             <a:endParaRPr lang="ko-KR" altLang="en-US"/>
           </a:p>
@@ -1404,7 +1404,7 @@
           <a:p>
             <a:fld id="{CB1DAC54-1E96-4A47-B03C-EAEB98ECE396}" type="datetimeFigureOut">
               <a:rPr lang="ko-KR" altLang="en-US" smtClean="0"/>
-              <a:t>2021-09-13</a:t>
+              <a:t>2021-09-14</a:t>
             </a:fld>
             <a:endParaRPr lang="ko-KR" altLang="en-US"/>
           </a:p>
@@ -1816,7 +1816,7 @@
           <a:p>
             <a:fld id="{CB1DAC54-1E96-4A47-B03C-EAEB98ECE396}" type="datetimeFigureOut">
               <a:rPr lang="ko-KR" altLang="en-US" smtClean="0"/>
-              <a:t>2021-09-13</a:t>
+              <a:t>2021-09-14</a:t>
             </a:fld>
             <a:endParaRPr lang="ko-KR" altLang="en-US"/>
           </a:p>
@@ -1957,7 +1957,7 @@
           <a:p>
             <a:fld id="{CB1DAC54-1E96-4A47-B03C-EAEB98ECE396}" type="datetimeFigureOut">
               <a:rPr lang="ko-KR" altLang="en-US" smtClean="0"/>
-              <a:t>2021-09-13</a:t>
+              <a:t>2021-09-14</a:t>
             </a:fld>
             <a:endParaRPr lang="ko-KR" altLang="en-US"/>
           </a:p>
@@ -2070,7 +2070,7 @@
           <a:p>
             <a:fld id="{CB1DAC54-1E96-4A47-B03C-EAEB98ECE396}" type="datetimeFigureOut">
               <a:rPr lang="ko-KR" altLang="en-US" smtClean="0"/>
-              <a:t>2021-09-13</a:t>
+              <a:t>2021-09-14</a:t>
             </a:fld>
             <a:endParaRPr lang="ko-KR" altLang="en-US"/>
           </a:p>
@@ -2381,7 +2381,7 @@
           <a:p>
             <a:fld id="{CB1DAC54-1E96-4A47-B03C-EAEB98ECE396}" type="datetimeFigureOut">
               <a:rPr lang="ko-KR" altLang="en-US" smtClean="0"/>
-              <a:t>2021-09-13</a:t>
+              <a:t>2021-09-14</a:t>
             </a:fld>
             <a:endParaRPr lang="ko-KR" altLang="en-US"/>
           </a:p>
@@ -2669,7 +2669,7 @@
           <a:p>
             <a:fld id="{CB1DAC54-1E96-4A47-B03C-EAEB98ECE396}" type="datetimeFigureOut">
               <a:rPr lang="ko-KR" altLang="en-US" smtClean="0"/>
-              <a:t>2021-09-13</a:t>
+              <a:t>2021-09-14</a:t>
             </a:fld>
             <a:endParaRPr lang="ko-KR" altLang="en-US"/>
           </a:p>
@@ -2910,7 +2910,7 @@
           <a:p>
             <a:fld id="{CB1DAC54-1E96-4A47-B03C-EAEB98ECE396}" type="datetimeFigureOut">
               <a:rPr lang="ko-KR" altLang="en-US" smtClean="0"/>
-              <a:t>2021-09-13</a:t>
+              <a:t>2021-09-14</a:t>
             </a:fld>
             <a:endParaRPr lang="ko-KR" altLang="en-US"/>
           </a:p>

</xml_diff>

<commit_message>
docs - ReadMe update, Project ppt update
</commit_message>
<xml_diff>
--- a/etc/MAKDUCK_suleesulee.pptx
+++ b/etc/MAKDUCK_suleesulee.pptx
@@ -7,6 +7,11 @@
   <p:sldIdLst>
     <p:sldId id="257" r:id="rId2"/>
     <p:sldId id="256" r:id="rId3"/>
+    <p:sldId id="258" r:id="rId4"/>
+    <p:sldId id="259" r:id="rId5"/>
+    <p:sldId id="261" r:id="rId6"/>
+    <p:sldId id="262" r:id="rId7"/>
+    <p:sldId id="260" r:id="rId8"/>
   </p:sldIdLst>
   <p:sldSz cx="12192000" cy="6858000"/>
   <p:notesSz cx="6858000" cy="9144000"/>
@@ -260,7 +265,7 @@
           <a:p>
             <a:fld id="{CB1DAC54-1E96-4A47-B03C-EAEB98ECE396}" type="datetimeFigureOut">
               <a:rPr lang="ko-KR" altLang="en-US" smtClean="0"/>
-              <a:t>2021-09-14</a:t>
+              <a:t>2021-09-15</a:t>
             </a:fld>
             <a:endParaRPr lang="ko-KR" altLang="en-US"/>
           </a:p>
@@ -458,7 +463,7 @@
           <a:p>
             <a:fld id="{CB1DAC54-1E96-4A47-B03C-EAEB98ECE396}" type="datetimeFigureOut">
               <a:rPr lang="ko-KR" altLang="en-US" smtClean="0"/>
-              <a:t>2021-09-14</a:t>
+              <a:t>2021-09-15</a:t>
             </a:fld>
             <a:endParaRPr lang="ko-KR" altLang="en-US"/>
           </a:p>
@@ -666,7 +671,7 @@
           <a:p>
             <a:fld id="{CB1DAC54-1E96-4A47-B03C-EAEB98ECE396}" type="datetimeFigureOut">
               <a:rPr lang="ko-KR" altLang="en-US" smtClean="0"/>
-              <a:t>2021-09-14</a:t>
+              <a:t>2021-09-15</a:t>
             </a:fld>
             <a:endParaRPr lang="ko-KR" altLang="en-US"/>
           </a:p>
@@ -864,7 +869,7 @@
           <a:p>
             <a:fld id="{CB1DAC54-1E96-4A47-B03C-EAEB98ECE396}" type="datetimeFigureOut">
               <a:rPr lang="ko-KR" altLang="en-US" smtClean="0"/>
-              <a:t>2021-09-14</a:t>
+              <a:t>2021-09-15</a:t>
             </a:fld>
             <a:endParaRPr lang="ko-KR" altLang="en-US"/>
           </a:p>
@@ -1139,7 +1144,7 @@
           <a:p>
             <a:fld id="{CB1DAC54-1E96-4A47-B03C-EAEB98ECE396}" type="datetimeFigureOut">
               <a:rPr lang="ko-KR" altLang="en-US" smtClean="0"/>
-              <a:t>2021-09-14</a:t>
+              <a:t>2021-09-15</a:t>
             </a:fld>
             <a:endParaRPr lang="ko-KR" altLang="en-US"/>
           </a:p>
@@ -1404,7 +1409,7 @@
           <a:p>
             <a:fld id="{CB1DAC54-1E96-4A47-B03C-EAEB98ECE396}" type="datetimeFigureOut">
               <a:rPr lang="ko-KR" altLang="en-US" smtClean="0"/>
-              <a:t>2021-09-14</a:t>
+              <a:t>2021-09-15</a:t>
             </a:fld>
             <a:endParaRPr lang="ko-KR" altLang="en-US"/>
           </a:p>
@@ -1816,7 +1821,7 @@
           <a:p>
             <a:fld id="{CB1DAC54-1E96-4A47-B03C-EAEB98ECE396}" type="datetimeFigureOut">
               <a:rPr lang="ko-KR" altLang="en-US" smtClean="0"/>
-              <a:t>2021-09-14</a:t>
+              <a:t>2021-09-15</a:t>
             </a:fld>
             <a:endParaRPr lang="ko-KR" altLang="en-US"/>
           </a:p>
@@ -1957,7 +1962,7 @@
           <a:p>
             <a:fld id="{CB1DAC54-1E96-4A47-B03C-EAEB98ECE396}" type="datetimeFigureOut">
               <a:rPr lang="ko-KR" altLang="en-US" smtClean="0"/>
-              <a:t>2021-09-14</a:t>
+              <a:t>2021-09-15</a:t>
             </a:fld>
             <a:endParaRPr lang="ko-KR" altLang="en-US"/>
           </a:p>
@@ -2070,7 +2075,7 @@
           <a:p>
             <a:fld id="{CB1DAC54-1E96-4A47-B03C-EAEB98ECE396}" type="datetimeFigureOut">
               <a:rPr lang="ko-KR" altLang="en-US" smtClean="0"/>
-              <a:t>2021-09-14</a:t>
+              <a:t>2021-09-15</a:t>
             </a:fld>
             <a:endParaRPr lang="ko-KR" altLang="en-US"/>
           </a:p>
@@ -2381,7 +2386,7 @@
           <a:p>
             <a:fld id="{CB1DAC54-1E96-4A47-B03C-EAEB98ECE396}" type="datetimeFigureOut">
               <a:rPr lang="ko-KR" altLang="en-US" smtClean="0"/>
-              <a:t>2021-09-14</a:t>
+              <a:t>2021-09-15</a:t>
             </a:fld>
             <a:endParaRPr lang="ko-KR" altLang="en-US"/>
           </a:p>
@@ -2669,7 +2674,7 @@
           <a:p>
             <a:fld id="{CB1DAC54-1E96-4A47-B03C-EAEB98ECE396}" type="datetimeFigureOut">
               <a:rPr lang="ko-KR" altLang="en-US" smtClean="0"/>
-              <a:t>2021-09-14</a:t>
+              <a:t>2021-09-15</a:t>
             </a:fld>
             <a:endParaRPr lang="ko-KR" altLang="en-US"/>
           </a:p>
@@ -2910,7 +2915,7 @@
           <a:p>
             <a:fld id="{CB1DAC54-1E96-4A47-B03C-EAEB98ECE396}" type="datetimeFigureOut">
               <a:rPr lang="ko-KR" altLang="en-US" smtClean="0"/>
-              <a:t>2021-09-14</a:t>
+              <a:t>2021-09-15</a:t>
             </a:fld>
             <a:endParaRPr lang="ko-KR" altLang="en-US"/>
           </a:p>
@@ -3966,6 +3971,2386 @@
 </p:sld>
 </file>
 
+<file path=ppt/slides/slide3.xml><?xml version="1.0" encoding="utf-8"?>
+<p:sld xmlns:a="http://schemas.openxmlformats.org/drawingml/2006/main" xmlns:r="http://schemas.openxmlformats.org/officeDocument/2006/relationships" xmlns:p="http://schemas.openxmlformats.org/presentationml/2006/main">
+  <p:cSld>
+    <p:spTree>
+      <p:nvGrpSpPr>
+        <p:cNvPr id="1" name=""/>
+        <p:cNvGrpSpPr/>
+        <p:nvPr/>
+      </p:nvGrpSpPr>
+      <p:grpSpPr>
+        <a:xfrm>
+          <a:off x="0" y="0"/>
+          <a:ext cx="0" cy="0"/>
+          <a:chOff x="0" y="0"/>
+          <a:chExt cx="0" cy="0"/>
+        </a:xfrm>
+      </p:grpSpPr>
+      <p:sp>
+        <p:nvSpPr>
+          <p:cNvPr id="4" name="TextBox 3">
+            <a:extLst>
+              <a:ext uri="{FF2B5EF4-FFF2-40B4-BE49-F238E27FC236}">
+                <a16:creationId xmlns:a16="http://schemas.microsoft.com/office/drawing/2014/main" id="{4EF497B9-4250-45CA-9310-F958047515F2}"/>
+              </a:ext>
+            </a:extLst>
+          </p:cNvPr>
+          <p:cNvSpPr txBox="1"/>
+          <p:nvPr/>
+        </p:nvSpPr>
+        <p:spPr>
+          <a:xfrm>
+            <a:off x="295275" y="200025"/>
+            <a:ext cx="5286375" cy="523220"/>
+          </a:xfrm>
+          <a:prstGeom prst="rect">
+            <a:avLst/>
+          </a:prstGeom>
+          <a:noFill/>
+        </p:spPr>
+        <p:txBody>
+          <a:bodyPr wrap="square" rtlCol="0">
+            <a:spAutoFit/>
+          </a:bodyPr>
+          <a:lstStyle/>
+          <a:p>
+            <a:r>
+              <a:rPr lang="ko-KR" altLang="en-US" sz="2800" dirty="0" err="1">
+                <a:latin typeface="+mj-lt"/>
+              </a:rPr>
+              <a:t>맥덕</a:t>
+            </a:r>
+            <a:r>
+              <a:rPr lang="en-US" altLang="ko-KR" sz="2800" dirty="0">
+                <a:latin typeface="+mj-lt"/>
+              </a:rPr>
+              <a:t>(</a:t>
+            </a:r>
+            <a:r>
+              <a:rPr lang="en-US" altLang="ko-KR" sz="2800" dirty="0"/>
+              <a:t>MAKDUCK</a:t>
+            </a:r>
+            <a:r>
+              <a:rPr lang="en-US" altLang="ko-KR" sz="2800" dirty="0">
+                <a:latin typeface="+mj-lt"/>
+              </a:rPr>
+              <a:t>)</a:t>
+            </a:r>
+            <a:endParaRPr lang="ko-KR" altLang="en-US" sz="2800" dirty="0">
+              <a:latin typeface="+mj-lt"/>
+            </a:endParaRPr>
+          </a:p>
+        </p:txBody>
+      </p:sp>
+      <p:sp>
+        <p:nvSpPr>
+          <p:cNvPr id="2" name="직사각형 1">
+            <a:extLst>
+              <a:ext uri="{FF2B5EF4-FFF2-40B4-BE49-F238E27FC236}">
+                <a16:creationId xmlns:a16="http://schemas.microsoft.com/office/drawing/2014/main" id="{F7E8736C-641E-4F2B-B5CE-8353CBD315FC}"/>
+              </a:ext>
+            </a:extLst>
+          </p:cNvPr>
+          <p:cNvSpPr/>
+          <p:nvPr/>
+        </p:nvSpPr>
+        <p:spPr>
+          <a:xfrm>
+            <a:off x="4164495" y="2146850"/>
+            <a:ext cx="3488634" cy="606287"/>
+          </a:xfrm>
+          <a:prstGeom prst="rect">
+            <a:avLst/>
+          </a:prstGeom>
+          <a:noFill/>
+          <a:ln>
+            <a:solidFill>
+              <a:schemeClr val="tx1"/>
+            </a:solidFill>
+          </a:ln>
+        </p:spPr>
+        <p:style>
+          <a:lnRef idx="2">
+            <a:schemeClr val="accent1">
+              <a:shade val="50000"/>
+            </a:schemeClr>
+          </a:lnRef>
+          <a:fillRef idx="1">
+            <a:schemeClr val="accent1"/>
+          </a:fillRef>
+          <a:effectRef idx="0">
+            <a:schemeClr val="accent1"/>
+          </a:effectRef>
+          <a:fontRef idx="minor">
+            <a:schemeClr val="lt1"/>
+          </a:fontRef>
+        </p:style>
+        <p:txBody>
+          <a:bodyPr rtlCol="0" anchor="ctr"/>
+          <a:lstStyle/>
+          <a:p>
+            <a:pPr algn="ctr"/>
+            <a:r>
+              <a:rPr lang="en-US" altLang="ko-KR" dirty="0">
+                <a:solidFill>
+                  <a:schemeClr val="tx1"/>
+                </a:solidFill>
+              </a:rPr>
+              <a:t>API Gateway &amp; Web</a:t>
+            </a:r>
+            <a:endParaRPr lang="ko-KR" altLang="en-US" dirty="0">
+              <a:solidFill>
+                <a:schemeClr val="tx1"/>
+              </a:solidFill>
+            </a:endParaRPr>
+          </a:p>
+        </p:txBody>
+      </p:sp>
+      <p:sp>
+        <p:nvSpPr>
+          <p:cNvPr id="6" name="직사각형 5">
+            <a:extLst>
+              <a:ext uri="{FF2B5EF4-FFF2-40B4-BE49-F238E27FC236}">
+                <a16:creationId xmlns:a16="http://schemas.microsoft.com/office/drawing/2014/main" id="{3330E30F-35C8-4FE2-8DB0-D50DE3B825BF}"/>
+              </a:ext>
+            </a:extLst>
+          </p:cNvPr>
+          <p:cNvSpPr/>
+          <p:nvPr/>
+        </p:nvSpPr>
+        <p:spPr>
+          <a:xfrm>
+            <a:off x="1659836" y="3472070"/>
+            <a:ext cx="1709529" cy="1229139"/>
+          </a:xfrm>
+          <a:prstGeom prst="rect">
+            <a:avLst/>
+          </a:prstGeom>
+          <a:noFill/>
+          <a:ln>
+            <a:solidFill>
+              <a:schemeClr val="tx1"/>
+            </a:solidFill>
+          </a:ln>
+        </p:spPr>
+        <p:style>
+          <a:lnRef idx="2">
+            <a:schemeClr val="accent1">
+              <a:shade val="50000"/>
+            </a:schemeClr>
+          </a:lnRef>
+          <a:fillRef idx="1">
+            <a:schemeClr val="accent1"/>
+          </a:fillRef>
+          <a:effectRef idx="0">
+            <a:schemeClr val="accent1"/>
+          </a:effectRef>
+          <a:fontRef idx="minor">
+            <a:schemeClr val="lt1"/>
+          </a:fontRef>
+        </p:style>
+        <p:txBody>
+          <a:bodyPr rtlCol="0" anchor="ctr"/>
+          <a:lstStyle/>
+          <a:p>
+            <a:pPr algn="ctr"/>
+            <a:r>
+              <a:rPr lang="en-US" altLang="ko-KR" dirty="0">
+                <a:solidFill>
+                  <a:schemeClr val="tx1"/>
+                </a:solidFill>
+              </a:rPr>
+              <a:t>Beer Service</a:t>
+            </a:r>
+            <a:endParaRPr lang="ko-KR" altLang="en-US" dirty="0">
+              <a:solidFill>
+                <a:schemeClr val="tx1"/>
+              </a:solidFill>
+            </a:endParaRPr>
+          </a:p>
+        </p:txBody>
+      </p:sp>
+      <p:sp>
+        <p:nvSpPr>
+          <p:cNvPr id="7" name="직사각형 6">
+            <a:extLst>
+              <a:ext uri="{FF2B5EF4-FFF2-40B4-BE49-F238E27FC236}">
+                <a16:creationId xmlns:a16="http://schemas.microsoft.com/office/drawing/2014/main" id="{D769D16F-CC6F-4A3C-A4AC-D4DBFDAF1AAA}"/>
+              </a:ext>
+            </a:extLst>
+          </p:cNvPr>
+          <p:cNvSpPr/>
+          <p:nvPr/>
+        </p:nvSpPr>
+        <p:spPr>
+          <a:xfrm>
+            <a:off x="8481393" y="3472070"/>
+            <a:ext cx="1709529" cy="1229139"/>
+          </a:xfrm>
+          <a:prstGeom prst="rect">
+            <a:avLst/>
+          </a:prstGeom>
+          <a:noFill/>
+          <a:ln>
+            <a:solidFill>
+              <a:schemeClr val="tx1"/>
+            </a:solidFill>
+          </a:ln>
+        </p:spPr>
+        <p:style>
+          <a:lnRef idx="2">
+            <a:schemeClr val="accent1">
+              <a:shade val="50000"/>
+            </a:schemeClr>
+          </a:lnRef>
+          <a:fillRef idx="1">
+            <a:schemeClr val="accent1"/>
+          </a:fillRef>
+          <a:effectRef idx="0">
+            <a:schemeClr val="accent1"/>
+          </a:effectRef>
+          <a:fontRef idx="minor">
+            <a:schemeClr val="lt1"/>
+          </a:fontRef>
+        </p:style>
+        <p:txBody>
+          <a:bodyPr rtlCol="0" anchor="ctr"/>
+          <a:lstStyle/>
+          <a:p>
+            <a:pPr algn="ctr"/>
+            <a:r>
+              <a:rPr lang="en-US" altLang="ko-KR" dirty="0">
+                <a:solidFill>
+                  <a:schemeClr val="tx1"/>
+                </a:solidFill>
+              </a:rPr>
+              <a:t>MC Service</a:t>
+            </a:r>
+            <a:endParaRPr lang="ko-KR" altLang="en-US" dirty="0">
+              <a:solidFill>
+                <a:schemeClr val="tx1"/>
+              </a:solidFill>
+            </a:endParaRPr>
+          </a:p>
+        </p:txBody>
+      </p:sp>
+      <p:sp>
+        <p:nvSpPr>
+          <p:cNvPr id="8" name="직사각형 7">
+            <a:extLst>
+              <a:ext uri="{FF2B5EF4-FFF2-40B4-BE49-F238E27FC236}">
+                <a16:creationId xmlns:a16="http://schemas.microsoft.com/office/drawing/2014/main" id="{C6607178-56A4-412B-8CE7-76C9156A617D}"/>
+              </a:ext>
+            </a:extLst>
+          </p:cNvPr>
+          <p:cNvSpPr/>
+          <p:nvPr/>
+        </p:nvSpPr>
+        <p:spPr>
+          <a:xfrm>
+            <a:off x="5054048" y="3472069"/>
+            <a:ext cx="1709529" cy="1229139"/>
+          </a:xfrm>
+          <a:prstGeom prst="rect">
+            <a:avLst/>
+          </a:prstGeom>
+          <a:noFill/>
+          <a:ln>
+            <a:solidFill>
+              <a:schemeClr val="tx1"/>
+            </a:solidFill>
+          </a:ln>
+        </p:spPr>
+        <p:style>
+          <a:lnRef idx="2">
+            <a:schemeClr val="accent1">
+              <a:shade val="50000"/>
+            </a:schemeClr>
+          </a:lnRef>
+          <a:fillRef idx="1">
+            <a:schemeClr val="accent1"/>
+          </a:fillRef>
+          <a:effectRef idx="0">
+            <a:schemeClr val="accent1"/>
+          </a:effectRef>
+          <a:fontRef idx="minor">
+            <a:schemeClr val="lt1"/>
+          </a:fontRef>
+        </p:style>
+        <p:txBody>
+          <a:bodyPr rtlCol="0" anchor="ctr"/>
+          <a:lstStyle/>
+          <a:p>
+            <a:pPr algn="ctr"/>
+            <a:r>
+              <a:rPr lang="en-US" altLang="ko-KR" dirty="0">
+                <a:solidFill>
+                  <a:schemeClr val="tx1"/>
+                </a:solidFill>
+              </a:rPr>
+              <a:t>User Service</a:t>
+            </a:r>
+            <a:endParaRPr lang="ko-KR" altLang="en-US" dirty="0">
+              <a:solidFill>
+                <a:schemeClr val="tx1"/>
+              </a:solidFill>
+            </a:endParaRPr>
+          </a:p>
+        </p:txBody>
+      </p:sp>
+      <p:sp>
+        <p:nvSpPr>
+          <p:cNvPr id="9" name="직사각형 8">
+            <a:extLst>
+              <a:ext uri="{FF2B5EF4-FFF2-40B4-BE49-F238E27FC236}">
+                <a16:creationId xmlns:a16="http://schemas.microsoft.com/office/drawing/2014/main" id="{0CB323DA-3ADE-4D86-BCD3-604D3FB157F1}"/>
+              </a:ext>
+            </a:extLst>
+          </p:cNvPr>
+          <p:cNvSpPr/>
+          <p:nvPr/>
+        </p:nvSpPr>
+        <p:spPr>
+          <a:xfrm>
+            <a:off x="3478696" y="5244548"/>
+            <a:ext cx="5002697" cy="523221"/>
+          </a:xfrm>
+          <a:prstGeom prst="rect">
+            <a:avLst/>
+          </a:prstGeom>
+          <a:noFill/>
+          <a:ln>
+            <a:solidFill>
+              <a:schemeClr val="tx1"/>
+            </a:solidFill>
+          </a:ln>
+        </p:spPr>
+        <p:style>
+          <a:lnRef idx="2">
+            <a:schemeClr val="accent1">
+              <a:shade val="50000"/>
+            </a:schemeClr>
+          </a:lnRef>
+          <a:fillRef idx="1">
+            <a:schemeClr val="accent1"/>
+          </a:fillRef>
+          <a:effectRef idx="0">
+            <a:schemeClr val="accent1"/>
+          </a:effectRef>
+          <a:fontRef idx="minor">
+            <a:schemeClr val="lt1"/>
+          </a:fontRef>
+        </p:style>
+        <p:txBody>
+          <a:bodyPr rtlCol="0" anchor="ctr"/>
+          <a:lstStyle/>
+          <a:p>
+            <a:pPr algn="ctr"/>
+            <a:r>
+              <a:rPr lang="en-US" altLang="ko-KR" dirty="0">
+                <a:solidFill>
+                  <a:schemeClr val="tx1"/>
+                </a:solidFill>
+              </a:rPr>
+              <a:t>Kafka</a:t>
+            </a:r>
+            <a:endParaRPr lang="ko-KR" altLang="en-US" dirty="0">
+              <a:solidFill>
+                <a:schemeClr val="tx1"/>
+              </a:solidFill>
+            </a:endParaRPr>
+          </a:p>
+        </p:txBody>
+      </p:sp>
+      <p:cxnSp>
+        <p:nvCxnSpPr>
+          <p:cNvPr id="10" name="연결선: 구부러짐 9">
+            <a:extLst>
+              <a:ext uri="{FF2B5EF4-FFF2-40B4-BE49-F238E27FC236}">
+                <a16:creationId xmlns:a16="http://schemas.microsoft.com/office/drawing/2014/main" id="{BAE4AF70-03C6-49E9-B506-95BB8167A2D0}"/>
+              </a:ext>
+            </a:extLst>
+          </p:cNvPr>
+          <p:cNvCxnSpPr>
+            <a:cxnSpLocks/>
+            <a:stCxn id="2" idx="2"/>
+            <a:endCxn id="6" idx="0"/>
+          </p:cNvCxnSpPr>
+          <p:nvPr/>
+        </p:nvCxnSpPr>
+        <p:spPr>
+          <a:xfrm rot="5400000">
+            <a:off x="3852241" y="1415498"/>
+            <a:ext cx="718933" cy="3394211"/>
+          </a:xfrm>
+          <a:prstGeom prst="curvedConnector3">
+            <a:avLst>
+              <a:gd name="adj1" fmla="val 50000"/>
+            </a:avLst>
+          </a:prstGeom>
+          <a:ln>
+            <a:solidFill>
+              <a:schemeClr val="tx1"/>
+            </a:solidFill>
+            <a:tailEnd type="triangle"/>
+          </a:ln>
+        </p:spPr>
+        <p:style>
+          <a:lnRef idx="1">
+            <a:schemeClr val="accent1"/>
+          </a:lnRef>
+          <a:fillRef idx="0">
+            <a:schemeClr val="accent1"/>
+          </a:fillRef>
+          <a:effectRef idx="0">
+            <a:schemeClr val="accent1"/>
+          </a:effectRef>
+          <a:fontRef idx="minor">
+            <a:schemeClr val="tx1"/>
+          </a:fontRef>
+        </p:style>
+      </p:cxnSp>
+      <p:cxnSp>
+        <p:nvCxnSpPr>
+          <p:cNvPr id="13" name="연결선: 구부러짐 12">
+            <a:extLst>
+              <a:ext uri="{FF2B5EF4-FFF2-40B4-BE49-F238E27FC236}">
+                <a16:creationId xmlns:a16="http://schemas.microsoft.com/office/drawing/2014/main" id="{9507C40B-CA1F-4C0A-B0B3-E248099AF929}"/>
+              </a:ext>
+            </a:extLst>
+          </p:cNvPr>
+          <p:cNvCxnSpPr>
+            <a:cxnSpLocks/>
+            <a:stCxn id="2" idx="2"/>
+            <a:endCxn id="7" idx="0"/>
+          </p:cNvCxnSpPr>
+          <p:nvPr/>
+        </p:nvCxnSpPr>
+        <p:spPr>
+          <a:xfrm rot="16200000" flipH="1">
+            <a:off x="7263019" y="1398930"/>
+            <a:ext cx="718933" cy="3427346"/>
+          </a:xfrm>
+          <a:prstGeom prst="curvedConnector3">
+            <a:avLst>
+              <a:gd name="adj1" fmla="val 50000"/>
+            </a:avLst>
+          </a:prstGeom>
+          <a:ln>
+            <a:solidFill>
+              <a:schemeClr val="tx1"/>
+            </a:solidFill>
+            <a:tailEnd type="triangle"/>
+          </a:ln>
+        </p:spPr>
+        <p:style>
+          <a:lnRef idx="1">
+            <a:schemeClr val="accent1"/>
+          </a:lnRef>
+          <a:fillRef idx="0">
+            <a:schemeClr val="accent1"/>
+          </a:fillRef>
+          <a:effectRef idx="0">
+            <a:schemeClr val="accent1"/>
+          </a:effectRef>
+          <a:fontRef idx="minor">
+            <a:schemeClr val="tx1"/>
+          </a:fontRef>
+        </p:style>
+      </p:cxnSp>
+      <p:cxnSp>
+        <p:nvCxnSpPr>
+          <p:cNvPr id="17" name="연결선: 구부러짐 16">
+            <a:extLst>
+              <a:ext uri="{FF2B5EF4-FFF2-40B4-BE49-F238E27FC236}">
+                <a16:creationId xmlns:a16="http://schemas.microsoft.com/office/drawing/2014/main" id="{20AED22A-A7D0-4C93-B17D-32390CEC97A8}"/>
+              </a:ext>
+            </a:extLst>
+          </p:cNvPr>
+          <p:cNvCxnSpPr>
+            <a:stCxn id="2" idx="2"/>
+            <a:endCxn id="8" idx="0"/>
+          </p:cNvCxnSpPr>
+          <p:nvPr/>
+        </p:nvCxnSpPr>
+        <p:spPr>
+          <a:xfrm rot="16200000" flipH="1">
+            <a:off x="5549346" y="3112602"/>
+            <a:ext cx="718932" cy="1"/>
+          </a:xfrm>
+          <a:prstGeom prst="curvedConnector3">
+            <a:avLst/>
+          </a:prstGeom>
+          <a:ln>
+            <a:solidFill>
+              <a:schemeClr val="tx1"/>
+            </a:solidFill>
+            <a:tailEnd type="triangle"/>
+          </a:ln>
+        </p:spPr>
+        <p:style>
+          <a:lnRef idx="1">
+            <a:schemeClr val="accent1"/>
+          </a:lnRef>
+          <a:fillRef idx="0">
+            <a:schemeClr val="accent1"/>
+          </a:fillRef>
+          <a:effectRef idx="0">
+            <a:schemeClr val="accent1"/>
+          </a:effectRef>
+          <a:fontRef idx="minor">
+            <a:schemeClr val="tx1"/>
+          </a:fontRef>
+        </p:style>
+      </p:cxnSp>
+      <p:sp>
+        <p:nvSpPr>
+          <p:cNvPr id="19" name="사다리꼴 18">
+            <a:extLst>
+              <a:ext uri="{FF2B5EF4-FFF2-40B4-BE49-F238E27FC236}">
+                <a16:creationId xmlns:a16="http://schemas.microsoft.com/office/drawing/2014/main" id="{020A6DE9-AED3-4EA6-ABAE-EF3206D7CAFB}"/>
+              </a:ext>
+            </a:extLst>
+          </p:cNvPr>
+          <p:cNvSpPr/>
+          <p:nvPr/>
+        </p:nvSpPr>
+        <p:spPr>
+          <a:xfrm>
+            <a:off x="5727810" y="1269345"/>
+            <a:ext cx="357809" cy="366986"/>
+          </a:xfrm>
+          <a:prstGeom prst="trapezoid">
+            <a:avLst/>
+          </a:prstGeom>
+          <a:solidFill>
+            <a:schemeClr val="tx1"/>
+          </a:solidFill>
+          <a:ln>
+            <a:solidFill>
+              <a:schemeClr val="tx1"/>
+            </a:solidFill>
+          </a:ln>
+        </p:spPr>
+        <p:style>
+          <a:lnRef idx="2">
+            <a:schemeClr val="accent1">
+              <a:shade val="50000"/>
+            </a:schemeClr>
+          </a:lnRef>
+          <a:fillRef idx="1">
+            <a:schemeClr val="accent1"/>
+          </a:fillRef>
+          <a:effectRef idx="0">
+            <a:schemeClr val="accent1"/>
+          </a:effectRef>
+          <a:fontRef idx="minor">
+            <a:schemeClr val="lt1"/>
+          </a:fontRef>
+        </p:style>
+        <p:txBody>
+          <a:bodyPr rtlCol="0" anchor="ctr"/>
+          <a:lstStyle/>
+          <a:p>
+            <a:pPr algn="ctr"/>
+            <a:endParaRPr lang="ko-KR" altLang="en-US"/>
+          </a:p>
+        </p:txBody>
+      </p:sp>
+      <p:sp>
+        <p:nvSpPr>
+          <p:cNvPr id="18" name="타원 17">
+            <a:extLst>
+              <a:ext uri="{FF2B5EF4-FFF2-40B4-BE49-F238E27FC236}">
+                <a16:creationId xmlns:a16="http://schemas.microsoft.com/office/drawing/2014/main" id="{72C7B44D-1B15-4398-861B-6A6960A63187}"/>
+              </a:ext>
+            </a:extLst>
+          </p:cNvPr>
+          <p:cNvSpPr/>
+          <p:nvPr/>
+        </p:nvSpPr>
+        <p:spPr>
+          <a:xfrm>
+            <a:off x="5727810" y="986731"/>
+            <a:ext cx="357809" cy="354499"/>
+          </a:xfrm>
+          <a:prstGeom prst="ellipse">
+            <a:avLst/>
+          </a:prstGeom>
+          <a:solidFill>
+            <a:schemeClr val="tx1"/>
+          </a:solidFill>
+          <a:ln>
+            <a:solidFill>
+              <a:schemeClr val="bg1"/>
+            </a:solidFill>
+          </a:ln>
+        </p:spPr>
+        <p:style>
+          <a:lnRef idx="2">
+            <a:schemeClr val="accent1">
+              <a:shade val="50000"/>
+            </a:schemeClr>
+          </a:lnRef>
+          <a:fillRef idx="1">
+            <a:schemeClr val="accent1"/>
+          </a:fillRef>
+          <a:effectRef idx="0">
+            <a:schemeClr val="accent1"/>
+          </a:effectRef>
+          <a:fontRef idx="minor">
+            <a:schemeClr val="lt1"/>
+          </a:fontRef>
+        </p:style>
+        <p:txBody>
+          <a:bodyPr rtlCol="0" anchor="ctr"/>
+          <a:lstStyle/>
+          <a:p>
+            <a:pPr algn="ctr"/>
+            <a:endParaRPr lang="ko-KR" altLang="en-US"/>
+          </a:p>
+        </p:txBody>
+      </p:sp>
+      <p:cxnSp>
+        <p:nvCxnSpPr>
+          <p:cNvPr id="21" name="직선 화살표 연결선 20">
+            <a:extLst>
+              <a:ext uri="{FF2B5EF4-FFF2-40B4-BE49-F238E27FC236}">
+                <a16:creationId xmlns:a16="http://schemas.microsoft.com/office/drawing/2014/main" id="{26117220-8EBF-4FFB-B9D8-EE30A5C86A73}"/>
+              </a:ext>
+            </a:extLst>
+          </p:cNvPr>
+          <p:cNvCxnSpPr>
+            <a:stCxn id="8" idx="1"/>
+            <a:endCxn id="6" idx="3"/>
+          </p:cNvCxnSpPr>
+          <p:nvPr/>
+        </p:nvCxnSpPr>
+        <p:spPr>
+          <a:xfrm flipH="1">
+            <a:off x="3369365" y="4086639"/>
+            <a:ext cx="1684683" cy="1"/>
+          </a:xfrm>
+          <a:prstGeom prst="straightConnector1">
+            <a:avLst/>
+          </a:prstGeom>
+          <a:ln>
+            <a:solidFill>
+              <a:schemeClr val="tx1"/>
+            </a:solidFill>
+            <a:tailEnd type="triangle"/>
+          </a:ln>
+        </p:spPr>
+        <p:style>
+          <a:lnRef idx="1">
+            <a:schemeClr val="accent1"/>
+          </a:lnRef>
+          <a:fillRef idx="0">
+            <a:schemeClr val="accent1"/>
+          </a:fillRef>
+          <a:effectRef idx="0">
+            <a:schemeClr val="accent1"/>
+          </a:effectRef>
+          <a:fontRef idx="minor">
+            <a:schemeClr val="tx1"/>
+          </a:fontRef>
+        </p:style>
+      </p:cxnSp>
+      <p:cxnSp>
+        <p:nvCxnSpPr>
+          <p:cNvPr id="23" name="연결선: 구부러짐 22">
+            <a:extLst>
+              <a:ext uri="{FF2B5EF4-FFF2-40B4-BE49-F238E27FC236}">
+                <a16:creationId xmlns:a16="http://schemas.microsoft.com/office/drawing/2014/main" id="{E1BC884E-F5A6-4E5E-A840-E700E8519DF8}"/>
+              </a:ext>
+            </a:extLst>
+          </p:cNvPr>
+          <p:cNvCxnSpPr>
+            <a:stCxn id="7" idx="2"/>
+            <a:endCxn id="9" idx="3"/>
+          </p:cNvCxnSpPr>
+          <p:nvPr/>
+        </p:nvCxnSpPr>
+        <p:spPr>
+          <a:xfrm rot="5400000">
+            <a:off x="8506301" y="4676302"/>
+            <a:ext cx="804950" cy="854765"/>
+          </a:xfrm>
+          <a:prstGeom prst="curvedConnector2">
+            <a:avLst/>
+          </a:prstGeom>
+          <a:ln>
+            <a:solidFill>
+              <a:schemeClr val="tx1"/>
+            </a:solidFill>
+            <a:tailEnd type="triangle"/>
+          </a:ln>
+        </p:spPr>
+        <p:style>
+          <a:lnRef idx="1">
+            <a:schemeClr val="accent1"/>
+          </a:lnRef>
+          <a:fillRef idx="0">
+            <a:schemeClr val="accent1"/>
+          </a:fillRef>
+          <a:effectRef idx="0">
+            <a:schemeClr val="accent1"/>
+          </a:effectRef>
+          <a:fontRef idx="minor">
+            <a:schemeClr val="tx1"/>
+          </a:fontRef>
+        </p:style>
+      </p:cxnSp>
+      <p:cxnSp>
+        <p:nvCxnSpPr>
+          <p:cNvPr id="25" name="연결선: 구부러짐 24">
+            <a:extLst>
+              <a:ext uri="{FF2B5EF4-FFF2-40B4-BE49-F238E27FC236}">
+                <a16:creationId xmlns:a16="http://schemas.microsoft.com/office/drawing/2014/main" id="{63AAC716-D69B-4546-AE2F-E7183BF58C24}"/>
+              </a:ext>
+            </a:extLst>
+          </p:cNvPr>
+          <p:cNvCxnSpPr>
+            <a:stCxn id="9" idx="1"/>
+            <a:endCxn id="6" idx="2"/>
+          </p:cNvCxnSpPr>
+          <p:nvPr/>
+        </p:nvCxnSpPr>
+        <p:spPr>
+          <a:xfrm rot="10800000">
+            <a:off x="2514602" y="4701209"/>
+            <a:ext cx="964095" cy="804950"/>
+          </a:xfrm>
+          <a:prstGeom prst="curvedConnector2">
+            <a:avLst/>
+          </a:prstGeom>
+          <a:ln>
+            <a:solidFill>
+              <a:schemeClr val="tx1"/>
+            </a:solidFill>
+            <a:tailEnd type="triangle"/>
+          </a:ln>
+        </p:spPr>
+        <p:style>
+          <a:lnRef idx="1">
+            <a:schemeClr val="accent1"/>
+          </a:lnRef>
+          <a:fillRef idx="0">
+            <a:schemeClr val="accent1"/>
+          </a:fillRef>
+          <a:effectRef idx="0">
+            <a:schemeClr val="accent1"/>
+          </a:effectRef>
+          <a:fontRef idx="minor">
+            <a:schemeClr val="tx1"/>
+          </a:fontRef>
+        </p:style>
+      </p:cxnSp>
+      <p:cxnSp>
+        <p:nvCxnSpPr>
+          <p:cNvPr id="27" name="직선 화살표 연결선 26">
+            <a:extLst>
+              <a:ext uri="{FF2B5EF4-FFF2-40B4-BE49-F238E27FC236}">
+                <a16:creationId xmlns:a16="http://schemas.microsoft.com/office/drawing/2014/main" id="{A0F0A1B9-05F5-41A4-B0D0-D3CE73D837C2}"/>
+              </a:ext>
+            </a:extLst>
+          </p:cNvPr>
+          <p:cNvCxnSpPr>
+            <a:stCxn id="19" idx="2"/>
+            <a:endCxn id="2" idx="0"/>
+          </p:cNvCxnSpPr>
+          <p:nvPr/>
+        </p:nvCxnSpPr>
+        <p:spPr>
+          <a:xfrm>
+            <a:off x="5906715" y="1636331"/>
+            <a:ext cx="2097" cy="510519"/>
+          </a:xfrm>
+          <a:prstGeom prst="straightConnector1">
+            <a:avLst/>
+          </a:prstGeom>
+          <a:ln>
+            <a:solidFill>
+              <a:schemeClr val="tx1"/>
+            </a:solidFill>
+            <a:tailEnd type="triangle"/>
+          </a:ln>
+        </p:spPr>
+        <p:style>
+          <a:lnRef idx="1">
+            <a:schemeClr val="accent1"/>
+          </a:lnRef>
+          <a:fillRef idx="0">
+            <a:schemeClr val="accent1"/>
+          </a:fillRef>
+          <a:effectRef idx="0">
+            <a:schemeClr val="accent1"/>
+          </a:effectRef>
+          <a:fontRef idx="minor">
+            <a:schemeClr val="tx1"/>
+          </a:fontRef>
+        </p:style>
+      </p:cxnSp>
+    </p:spTree>
+    <p:extLst>
+      <p:ext uri="{BB962C8B-B14F-4D97-AF65-F5344CB8AC3E}">
+        <p14:creationId xmlns:p14="http://schemas.microsoft.com/office/powerpoint/2010/main" val="746894354"/>
+      </p:ext>
+    </p:extLst>
+  </p:cSld>
+  <p:clrMapOvr>
+    <a:masterClrMapping/>
+  </p:clrMapOvr>
+</p:sld>
+</file>
+
+<file path=ppt/slides/slide4.xml><?xml version="1.0" encoding="utf-8"?>
+<p:sld xmlns:a="http://schemas.openxmlformats.org/drawingml/2006/main" xmlns:r="http://schemas.openxmlformats.org/officeDocument/2006/relationships" xmlns:p="http://schemas.openxmlformats.org/presentationml/2006/main">
+  <p:cSld>
+    <p:spTree>
+      <p:nvGrpSpPr>
+        <p:cNvPr id="1" name=""/>
+        <p:cNvGrpSpPr/>
+        <p:nvPr/>
+      </p:nvGrpSpPr>
+      <p:grpSpPr>
+        <a:xfrm>
+          <a:off x="0" y="0"/>
+          <a:ext cx="0" cy="0"/>
+          <a:chOff x="0" y="0"/>
+          <a:chExt cx="0" cy="0"/>
+        </a:xfrm>
+      </p:grpSpPr>
+      <p:sp>
+        <p:nvSpPr>
+          <p:cNvPr id="4" name="TextBox 3">
+            <a:extLst>
+              <a:ext uri="{FF2B5EF4-FFF2-40B4-BE49-F238E27FC236}">
+                <a16:creationId xmlns:a16="http://schemas.microsoft.com/office/drawing/2014/main" id="{4EF497B9-4250-45CA-9310-F958047515F2}"/>
+              </a:ext>
+            </a:extLst>
+          </p:cNvPr>
+          <p:cNvSpPr txBox="1"/>
+          <p:nvPr/>
+        </p:nvSpPr>
+        <p:spPr>
+          <a:xfrm>
+            <a:off x="295275" y="200025"/>
+            <a:ext cx="7753455" cy="523220"/>
+          </a:xfrm>
+          <a:prstGeom prst="rect">
+            <a:avLst/>
+          </a:prstGeom>
+          <a:noFill/>
+        </p:spPr>
+        <p:txBody>
+          <a:bodyPr wrap="square" rtlCol="0">
+            <a:spAutoFit/>
+          </a:bodyPr>
+          <a:lstStyle/>
+          <a:p>
+            <a:r>
+              <a:rPr lang="ko-KR" altLang="en-US" sz="2800" dirty="0" err="1">
+                <a:latin typeface="+mj-lt"/>
+              </a:rPr>
+              <a:t>맥덕</a:t>
+            </a:r>
+            <a:r>
+              <a:rPr lang="en-US" altLang="ko-KR" sz="2800" dirty="0">
+                <a:latin typeface="+mj-lt"/>
+              </a:rPr>
+              <a:t>(</a:t>
+            </a:r>
+            <a:r>
+              <a:rPr lang="en-US" altLang="ko-KR" sz="2800" dirty="0"/>
+              <a:t>MAKDUCK</a:t>
+            </a:r>
+            <a:r>
+              <a:rPr lang="en-US" altLang="ko-KR" sz="2800" dirty="0">
+                <a:latin typeface="+mj-lt"/>
+              </a:rPr>
+              <a:t>) User-service</a:t>
+            </a:r>
+            <a:r>
+              <a:rPr lang="ko-KR" altLang="en-US" sz="2800" dirty="0">
+                <a:latin typeface="+mj-lt"/>
+              </a:rPr>
+              <a:t>의 주요기능</a:t>
+            </a:r>
+          </a:p>
+        </p:txBody>
+      </p:sp>
+      <p:sp>
+        <p:nvSpPr>
+          <p:cNvPr id="11" name="TextBox 10">
+            <a:extLst>
+              <a:ext uri="{FF2B5EF4-FFF2-40B4-BE49-F238E27FC236}">
+                <a16:creationId xmlns:a16="http://schemas.microsoft.com/office/drawing/2014/main" id="{E9DDFDE4-6842-49C6-83B5-6A69FF903847}"/>
+              </a:ext>
+            </a:extLst>
+          </p:cNvPr>
+          <p:cNvSpPr txBox="1"/>
+          <p:nvPr/>
+        </p:nvSpPr>
+        <p:spPr>
+          <a:xfrm>
+            <a:off x="295275" y="1168227"/>
+            <a:ext cx="10193816" cy="2585323"/>
+          </a:xfrm>
+          <a:prstGeom prst="rect">
+            <a:avLst/>
+          </a:prstGeom>
+          <a:noFill/>
+        </p:spPr>
+        <p:txBody>
+          <a:bodyPr wrap="none" rtlCol="0">
+            <a:spAutoFit/>
+          </a:bodyPr>
+          <a:lstStyle/>
+          <a:p>
+            <a:r>
+              <a:rPr lang="ko-KR" altLang="en-US" dirty="0"/>
+              <a:t>회원가입</a:t>
+            </a:r>
+            <a:endParaRPr lang="en-US" altLang="ko-KR" dirty="0"/>
+          </a:p>
+          <a:p>
+            <a:r>
+              <a:rPr lang="en-US" altLang="ko-KR" dirty="0"/>
+              <a:t>- </a:t>
+            </a:r>
+            <a:r>
+              <a:rPr lang="ko-KR" altLang="en-US" dirty="0"/>
+              <a:t>일반 </a:t>
+            </a:r>
+            <a:r>
+              <a:rPr lang="en-US" altLang="ko-KR" dirty="0"/>
+              <a:t>Email </a:t>
+            </a:r>
+            <a:r>
+              <a:rPr lang="ko-KR" altLang="en-US" dirty="0"/>
+              <a:t>가입</a:t>
+            </a:r>
+            <a:endParaRPr lang="en-US" altLang="ko-KR" dirty="0"/>
+          </a:p>
+          <a:p>
+            <a:r>
+              <a:rPr lang="en-US" altLang="ko-KR" dirty="0"/>
+              <a:t>- </a:t>
+            </a:r>
+            <a:r>
+              <a:rPr lang="en-US" altLang="ko-KR" dirty="0" err="1"/>
+              <a:t>Oauth</a:t>
+            </a:r>
+            <a:r>
+              <a:rPr lang="ko-KR" altLang="en-US" dirty="0"/>
+              <a:t>를 통한 가입</a:t>
+            </a:r>
+            <a:r>
+              <a:rPr lang="en-US" altLang="ko-KR" dirty="0"/>
+              <a:t>(</a:t>
+            </a:r>
+            <a:r>
+              <a:rPr lang="ko-KR" altLang="en-US" dirty="0"/>
+              <a:t>네이버</a:t>
+            </a:r>
+            <a:r>
+              <a:rPr lang="en-US" altLang="ko-KR" dirty="0"/>
+              <a:t>)</a:t>
+            </a:r>
+          </a:p>
+          <a:p>
+            <a:r>
+              <a:rPr lang="en-US" altLang="ko-KR" dirty="0"/>
+              <a:t> </a:t>
+            </a:r>
+          </a:p>
+          <a:p>
+            <a:r>
+              <a:rPr lang="ko-KR" altLang="en-US" dirty="0"/>
+              <a:t>로그인</a:t>
+            </a:r>
+            <a:br>
+              <a:rPr lang="en-US" altLang="ko-KR" dirty="0"/>
+            </a:br>
+            <a:r>
+              <a:rPr lang="en-US" altLang="ko-KR" dirty="0"/>
+              <a:t>-</a:t>
+            </a:r>
+            <a:r>
+              <a:rPr lang="ko-KR" altLang="en-US" dirty="0"/>
+              <a:t> 로그인하지 않으면 단순 읽기만 가능함</a:t>
+            </a:r>
+            <a:r>
+              <a:rPr lang="en-US" altLang="ko-KR" dirty="0"/>
+              <a:t>. </a:t>
+            </a:r>
+            <a:r>
+              <a:rPr lang="ko-KR" altLang="en-US" dirty="0"/>
+              <a:t>로그인 해야 게시판 댓글 기능</a:t>
+            </a:r>
+            <a:r>
+              <a:rPr lang="en-US" altLang="ko-KR" dirty="0"/>
+              <a:t>, MC</a:t>
+            </a:r>
+            <a:r>
+              <a:rPr lang="ko-KR" altLang="en-US" dirty="0"/>
+              <a:t> 등록 기능 사용 가능</a:t>
+            </a:r>
+            <a:endParaRPr lang="en-US" altLang="ko-KR" dirty="0"/>
+          </a:p>
+          <a:p>
+            <a:endParaRPr lang="en-US" altLang="ko-KR" dirty="0"/>
+          </a:p>
+          <a:p>
+            <a:r>
+              <a:rPr lang="ko-KR" altLang="en-US" dirty="0"/>
+              <a:t>내 정보보기</a:t>
+            </a:r>
+            <a:endParaRPr lang="en-US" altLang="ko-KR" dirty="0"/>
+          </a:p>
+          <a:p>
+            <a:r>
+              <a:rPr lang="ko-KR" altLang="en-US" dirty="0"/>
+              <a:t> </a:t>
+            </a:r>
+            <a:r>
+              <a:rPr lang="en-US" altLang="ko-KR" dirty="0"/>
+              <a:t>- </a:t>
+            </a:r>
+            <a:r>
+              <a:rPr lang="ko-KR" altLang="en-US" dirty="0"/>
+              <a:t>내가 쓴 글 보기</a:t>
+            </a:r>
+            <a:r>
+              <a:rPr lang="en-US" altLang="ko-KR" dirty="0"/>
+              <a:t>, </a:t>
+            </a:r>
+            <a:r>
+              <a:rPr lang="ko-KR" altLang="en-US" dirty="0"/>
+              <a:t>댓글 보기</a:t>
+            </a:r>
+            <a:endParaRPr lang="en-US" altLang="ko-KR" dirty="0"/>
+          </a:p>
+        </p:txBody>
+      </p:sp>
+    </p:spTree>
+    <p:extLst>
+      <p:ext uri="{BB962C8B-B14F-4D97-AF65-F5344CB8AC3E}">
+        <p14:creationId xmlns:p14="http://schemas.microsoft.com/office/powerpoint/2010/main" val="1755697864"/>
+      </p:ext>
+    </p:extLst>
+  </p:cSld>
+  <p:clrMapOvr>
+    <a:masterClrMapping/>
+  </p:clrMapOvr>
+</p:sld>
+</file>
+
+<file path=ppt/slides/slide5.xml><?xml version="1.0" encoding="utf-8"?>
+<p:sld xmlns:a="http://schemas.openxmlformats.org/drawingml/2006/main" xmlns:r="http://schemas.openxmlformats.org/officeDocument/2006/relationships" xmlns:p="http://schemas.openxmlformats.org/presentationml/2006/main">
+  <p:cSld>
+    <p:spTree>
+      <p:nvGrpSpPr>
+        <p:cNvPr id="1" name=""/>
+        <p:cNvGrpSpPr/>
+        <p:nvPr/>
+      </p:nvGrpSpPr>
+      <p:grpSpPr>
+        <a:xfrm>
+          <a:off x="0" y="0"/>
+          <a:ext cx="0" cy="0"/>
+          <a:chOff x="0" y="0"/>
+          <a:chExt cx="0" cy="0"/>
+        </a:xfrm>
+      </p:grpSpPr>
+      <p:sp>
+        <p:nvSpPr>
+          <p:cNvPr id="4" name="TextBox 3">
+            <a:extLst>
+              <a:ext uri="{FF2B5EF4-FFF2-40B4-BE49-F238E27FC236}">
+                <a16:creationId xmlns:a16="http://schemas.microsoft.com/office/drawing/2014/main" id="{4EF497B9-4250-45CA-9310-F958047515F2}"/>
+              </a:ext>
+            </a:extLst>
+          </p:cNvPr>
+          <p:cNvSpPr txBox="1"/>
+          <p:nvPr/>
+        </p:nvSpPr>
+        <p:spPr>
+          <a:xfrm>
+            <a:off x="295275" y="200025"/>
+            <a:ext cx="7753455" cy="523220"/>
+          </a:xfrm>
+          <a:prstGeom prst="rect">
+            <a:avLst/>
+          </a:prstGeom>
+          <a:noFill/>
+        </p:spPr>
+        <p:txBody>
+          <a:bodyPr wrap="square" rtlCol="0">
+            <a:spAutoFit/>
+          </a:bodyPr>
+          <a:lstStyle/>
+          <a:p>
+            <a:r>
+              <a:rPr lang="ko-KR" altLang="en-US" sz="2800" dirty="0" err="1">
+                <a:latin typeface="+mj-lt"/>
+              </a:rPr>
+              <a:t>맥덕</a:t>
+            </a:r>
+            <a:r>
+              <a:rPr lang="en-US" altLang="ko-KR" sz="2800" dirty="0">
+                <a:latin typeface="+mj-lt"/>
+              </a:rPr>
+              <a:t>(</a:t>
+            </a:r>
+            <a:r>
+              <a:rPr lang="en-US" altLang="ko-KR" sz="2800" dirty="0"/>
+              <a:t>MAKDUCK</a:t>
+            </a:r>
+            <a:r>
+              <a:rPr lang="en-US" altLang="ko-KR" sz="2800" dirty="0">
+                <a:latin typeface="+mj-lt"/>
+              </a:rPr>
+              <a:t>) Beer-service</a:t>
+            </a:r>
+            <a:r>
+              <a:rPr lang="ko-KR" altLang="en-US" sz="2800" dirty="0">
+                <a:latin typeface="+mj-lt"/>
+              </a:rPr>
+              <a:t>의 주요기능</a:t>
+            </a:r>
+          </a:p>
+        </p:txBody>
+      </p:sp>
+      <p:sp>
+        <p:nvSpPr>
+          <p:cNvPr id="11" name="TextBox 10">
+            <a:extLst>
+              <a:ext uri="{FF2B5EF4-FFF2-40B4-BE49-F238E27FC236}">
+                <a16:creationId xmlns:a16="http://schemas.microsoft.com/office/drawing/2014/main" id="{E9DDFDE4-6842-49C6-83B5-6A69FF903847}"/>
+              </a:ext>
+            </a:extLst>
+          </p:cNvPr>
+          <p:cNvSpPr txBox="1"/>
+          <p:nvPr/>
+        </p:nvSpPr>
+        <p:spPr>
+          <a:xfrm>
+            <a:off x="295275" y="1168227"/>
+            <a:ext cx="5386411" cy="2862322"/>
+          </a:xfrm>
+          <a:prstGeom prst="rect">
+            <a:avLst/>
+          </a:prstGeom>
+          <a:noFill/>
+        </p:spPr>
+        <p:txBody>
+          <a:bodyPr wrap="none" rtlCol="0">
+            <a:spAutoFit/>
+          </a:bodyPr>
+          <a:lstStyle/>
+          <a:p>
+            <a:r>
+              <a:rPr lang="ko-KR" altLang="en-US" dirty="0"/>
+              <a:t>맥주정보 보기</a:t>
+            </a:r>
+            <a:endParaRPr lang="en-US" altLang="ko-KR" dirty="0"/>
+          </a:p>
+          <a:p>
+            <a:pPr marL="285750" indent="-285750">
+              <a:buFontTx/>
+              <a:buChar char="-"/>
+            </a:pPr>
+            <a:r>
+              <a:rPr lang="ko-KR" altLang="en-US" dirty="0"/>
+              <a:t>각 맥주에 대한 정보를 보여줌</a:t>
+            </a:r>
+            <a:endParaRPr lang="en-US" altLang="ko-KR" dirty="0"/>
+          </a:p>
+          <a:p>
+            <a:pPr marL="285750" indent="-285750">
+              <a:buFontTx/>
+              <a:buChar char="-"/>
+            </a:pPr>
+            <a:r>
+              <a:rPr lang="ko-KR" altLang="en-US" dirty="0"/>
+              <a:t>각 맥주의 스타일에 대한 정리를 보여주는 부분</a:t>
+            </a:r>
+            <a:endParaRPr lang="en-US" altLang="ko-KR" dirty="0"/>
+          </a:p>
+          <a:p>
+            <a:endParaRPr lang="en-US" altLang="ko-KR" dirty="0"/>
+          </a:p>
+          <a:p>
+            <a:r>
+              <a:rPr lang="en-US" altLang="ko-KR" dirty="0"/>
+              <a:t>-</a:t>
+            </a:r>
+            <a:r>
+              <a:rPr lang="ko-KR" altLang="en-US" dirty="0"/>
+              <a:t>해당 맥주에 대한 사람들의 생각을 보여주는 부분</a:t>
+            </a:r>
+            <a:endParaRPr lang="en-US" altLang="ko-KR" dirty="0"/>
+          </a:p>
+          <a:p>
+            <a:endParaRPr lang="en-US" altLang="ko-KR" dirty="0"/>
+          </a:p>
+          <a:p>
+            <a:endParaRPr lang="en-US" altLang="ko-KR" dirty="0"/>
+          </a:p>
+          <a:p>
+            <a:r>
+              <a:rPr lang="en-US" altLang="ko-KR" dirty="0"/>
+              <a:t>- </a:t>
+            </a:r>
+            <a:r>
+              <a:rPr lang="ko-KR" altLang="en-US" dirty="0"/>
+              <a:t>양조장 또는 제조회사 정보</a:t>
+            </a:r>
+            <a:endParaRPr lang="en-US" altLang="ko-KR" dirty="0"/>
+          </a:p>
+          <a:p>
+            <a:endParaRPr lang="en-US" altLang="ko-KR" dirty="0"/>
+          </a:p>
+          <a:p>
+            <a:r>
+              <a:rPr lang="en-US" altLang="ko-KR" dirty="0"/>
+              <a:t>-</a:t>
+            </a:r>
+            <a:r>
+              <a:rPr lang="ko-KR" altLang="en-US" dirty="0"/>
+              <a:t> 근처 판매하는 곳 알아보기</a:t>
+            </a:r>
+            <a:r>
+              <a:rPr lang="en-US" altLang="ko-KR" dirty="0"/>
+              <a:t>?</a:t>
+            </a:r>
+          </a:p>
+        </p:txBody>
+      </p:sp>
+    </p:spTree>
+    <p:extLst>
+      <p:ext uri="{BB962C8B-B14F-4D97-AF65-F5344CB8AC3E}">
+        <p14:creationId xmlns:p14="http://schemas.microsoft.com/office/powerpoint/2010/main" val="95274191"/>
+      </p:ext>
+    </p:extLst>
+  </p:cSld>
+  <p:clrMapOvr>
+    <a:masterClrMapping/>
+  </p:clrMapOvr>
+</p:sld>
+</file>
+
+<file path=ppt/slides/slide6.xml><?xml version="1.0" encoding="utf-8"?>
+<p:sld xmlns:a="http://schemas.openxmlformats.org/drawingml/2006/main" xmlns:r="http://schemas.openxmlformats.org/officeDocument/2006/relationships" xmlns:p="http://schemas.openxmlformats.org/presentationml/2006/main">
+  <p:cSld>
+    <p:spTree>
+      <p:nvGrpSpPr>
+        <p:cNvPr id="1" name=""/>
+        <p:cNvGrpSpPr/>
+        <p:nvPr/>
+      </p:nvGrpSpPr>
+      <p:grpSpPr>
+        <a:xfrm>
+          <a:off x="0" y="0"/>
+          <a:ext cx="0" cy="0"/>
+          <a:chOff x="0" y="0"/>
+          <a:chExt cx="0" cy="0"/>
+        </a:xfrm>
+      </p:grpSpPr>
+      <p:sp>
+        <p:nvSpPr>
+          <p:cNvPr id="4" name="TextBox 3">
+            <a:extLst>
+              <a:ext uri="{FF2B5EF4-FFF2-40B4-BE49-F238E27FC236}">
+                <a16:creationId xmlns:a16="http://schemas.microsoft.com/office/drawing/2014/main" id="{4EF497B9-4250-45CA-9310-F958047515F2}"/>
+              </a:ext>
+            </a:extLst>
+          </p:cNvPr>
+          <p:cNvSpPr txBox="1"/>
+          <p:nvPr/>
+        </p:nvSpPr>
+        <p:spPr>
+          <a:xfrm>
+            <a:off x="295275" y="200025"/>
+            <a:ext cx="7753455" cy="523220"/>
+          </a:xfrm>
+          <a:prstGeom prst="rect">
+            <a:avLst/>
+          </a:prstGeom>
+          <a:noFill/>
+        </p:spPr>
+        <p:txBody>
+          <a:bodyPr wrap="square" rtlCol="0">
+            <a:spAutoFit/>
+          </a:bodyPr>
+          <a:lstStyle/>
+          <a:p>
+            <a:r>
+              <a:rPr lang="ko-KR" altLang="en-US" sz="2800" dirty="0" err="1">
+                <a:latin typeface="+mj-lt"/>
+              </a:rPr>
+              <a:t>맥덕</a:t>
+            </a:r>
+            <a:r>
+              <a:rPr lang="en-US" altLang="ko-KR" sz="2800" dirty="0">
+                <a:latin typeface="+mj-lt"/>
+              </a:rPr>
+              <a:t>(</a:t>
+            </a:r>
+            <a:r>
+              <a:rPr lang="en-US" altLang="ko-KR" sz="2800" dirty="0"/>
+              <a:t>MAKDUCK</a:t>
+            </a:r>
+            <a:r>
+              <a:rPr lang="en-US" altLang="ko-KR" sz="2800" dirty="0">
+                <a:latin typeface="+mj-lt"/>
+              </a:rPr>
+              <a:t>) MC-service</a:t>
+            </a:r>
+            <a:r>
+              <a:rPr lang="ko-KR" altLang="en-US" sz="2800" dirty="0">
+                <a:latin typeface="+mj-lt"/>
+              </a:rPr>
+              <a:t>의 주요기능</a:t>
+            </a:r>
+          </a:p>
+        </p:txBody>
+      </p:sp>
+      <p:sp>
+        <p:nvSpPr>
+          <p:cNvPr id="11" name="TextBox 10">
+            <a:extLst>
+              <a:ext uri="{FF2B5EF4-FFF2-40B4-BE49-F238E27FC236}">
+                <a16:creationId xmlns:a16="http://schemas.microsoft.com/office/drawing/2014/main" id="{E9DDFDE4-6842-49C6-83B5-6A69FF903847}"/>
+              </a:ext>
+            </a:extLst>
+          </p:cNvPr>
+          <p:cNvSpPr txBox="1"/>
+          <p:nvPr/>
+        </p:nvSpPr>
+        <p:spPr>
+          <a:xfrm>
+            <a:off x="295275" y="1168227"/>
+            <a:ext cx="6527749" cy="1477328"/>
+          </a:xfrm>
+          <a:prstGeom prst="rect">
+            <a:avLst/>
+          </a:prstGeom>
+          <a:noFill/>
+        </p:spPr>
+        <p:txBody>
+          <a:bodyPr wrap="none" rtlCol="0">
+            <a:spAutoFit/>
+          </a:bodyPr>
+          <a:lstStyle/>
+          <a:p>
+            <a:r>
+              <a:rPr lang="ko-KR" altLang="en-US" dirty="0"/>
+              <a:t>위치 정보에 따른 </a:t>
+            </a:r>
+            <a:r>
+              <a:rPr lang="ko-KR" altLang="en-US" dirty="0" err="1"/>
+              <a:t>근처마트와</a:t>
+            </a:r>
+            <a:r>
+              <a:rPr lang="ko-KR" altLang="en-US" dirty="0"/>
+              <a:t> 편의점의 파는 맥주정보를 정렬</a:t>
+            </a:r>
+            <a:endParaRPr lang="en-US" altLang="ko-KR" dirty="0"/>
+          </a:p>
+          <a:p>
+            <a:r>
+              <a:rPr lang="ko-KR" altLang="en-US" dirty="0"/>
+              <a:t>마트의 위치에 따른 맥주 정보 등록</a:t>
+            </a:r>
+            <a:endParaRPr lang="en-US" altLang="ko-KR" dirty="0"/>
+          </a:p>
+          <a:p>
+            <a:r>
+              <a:rPr lang="ko-KR" altLang="en-US" dirty="0"/>
+              <a:t> </a:t>
+            </a:r>
+            <a:r>
+              <a:rPr lang="en-US" altLang="ko-KR" dirty="0"/>
+              <a:t>- </a:t>
+            </a:r>
+            <a:r>
+              <a:rPr lang="ko-KR" altLang="en-US" dirty="0"/>
+              <a:t>현재 위치에 따른 마트 등록이 선행 되어야함</a:t>
+            </a:r>
+            <a:endParaRPr lang="en-US" altLang="ko-KR" dirty="0"/>
+          </a:p>
+          <a:p>
+            <a:r>
+              <a:rPr lang="ko-KR" altLang="en-US" dirty="0"/>
+              <a:t>마트에 내가 본 맥주의 정보를 등록 할 수 있는 기능</a:t>
+            </a:r>
+            <a:endParaRPr lang="en-US" altLang="ko-KR" dirty="0"/>
+          </a:p>
+          <a:p>
+            <a:endParaRPr lang="en-US" altLang="ko-KR" dirty="0"/>
+          </a:p>
+        </p:txBody>
+      </p:sp>
+      <p:sp>
+        <p:nvSpPr>
+          <p:cNvPr id="3" name="직사각형 2">
+            <a:extLst>
+              <a:ext uri="{FF2B5EF4-FFF2-40B4-BE49-F238E27FC236}">
+                <a16:creationId xmlns:a16="http://schemas.microsoft.com/office/drawing/2014/main" id="{E37E8B2D-2FD2-45A7-8C06-478E618BD0B6}"/>
+              </a:ext>
+            </a:extLst>
+          </p:cNvPr>
+          <p:cNvSpPr/>
+          <p:nvPr/>
+        </p:nvSpPr>
+        <p:spPr>
+          <a:xfrm>
+            <a:off x="743577" y="2661296"/>
+            <a:ext cx="4421275" cy="3336053"/>
+          </a:xfrm>
+          <a:prstGeom prst="rect">
+            <a:avLst/>
+          </a:prstGeom>
+          <a:noFill/>
+          <a:ln>
+            <a:solidFill>
+              <a:schemeClr val="tx1"/>
+            </a:solidFill>
+          </a:ln>
+        </p:spPr>
+        <p:style>
+          <a:lnRef idx="2">
+            <a:schemeClr val="accent1">
+              <a:shade val="50000"/>
+            </a:schemeClr>
+          </a:lnRef>
+          <a:fillRef idx="1">
+            <a:schemeClr val="accent1"/>
+          </a:fillRef>
+          <a:effectRef idx="0">
+            <a:schemeClr val="accent1"/>
+          </a:effectRef>
+          <a:fontRef idx="minor">
+            <a:schemeClr val="lt1"/>
+          </a:fontRef>
+        </p:style>
+        <p:txBody>
+          <a:bodyPr rtlCol="0" anchor="ctr"/>
+          <a:lstStyle/>
+          <a:p>
+            <a:pPr algn="ctr"/>
+            <a:endParaRPr lang="ko-KR" altLang="en-US"/>
+          </a:p>
+        </p:txBody>
+      </p:sp>
+      <p:sp>
+        <p:nvSpPr>
+          <p:cNvPr id="7" name="직사각형 6">
+            <a:extLst>
+              <a:ext uri="{FF2B5EF4-FFF2-40B4-BE49-F238E27FC236}">
+                <a16:creationId xmlns:a16="http://schemas.microsoft.com/office/drawing/2014/main" id="{EC750870-13C6-4CF9-821F-3F2780E6E73C}"/>
+              </a:ext>
+            </a:extLst>
+          </p:cNvPr>
+          <p:cNvSpPr/>
+          <p:nvPr/>
+        </p:nvSpPr>
+        <p:spPr>
+          <a:xfrm>
+            <a:off x="1048376" y="3946764"/>
+            <a:ext cx="1857272" cy="1307725"/>
+          </a:xfrm>
+          <a:prstGeom prst="rect">
+            <a:avLst/>
+          </a:prstGeom>
+          <a:noFill/>
+          <a:ln>
+            <a:solidFill>
+              <a:schemeClr val="tx1"/>
+            </a:solidFill>
+          </a:ln>
+        </p:spPr>
+        <p:style>
+          <a:lnRef idx="2">
+            <a:schemeClr val="accent1">
+              <a:shade val="50000"/>
+            </a:schemeClr>
+          </a:lnRef>
+          <a:fillRef idx="1">
+            <a:schemeClr val="accent1"/>
+          </a:fillRef>
+          <a:effectRef idx="0">
+            <a:schemeClr val="accent1"/>
+          </a:effectRef>
+          <a:fontRef idx="minor">
+            <a:schemeClr val="lt1"/>
+          </a:fontRef>
+        </p:style>
+        <p:txBody>
+          <a:bodyPr rtlCol="0" anchor="ctr"/>
+          <a:lstStyle/>
+          <a:p>
+            <a:pPr algn="ctr"/>
+            <a:r>
+              <a:rPr lang="ko-KR" altLang="en-US" dirty="0">
+                <a:solidFill>
+                  <a:schemeClr val="tx1"/>
+                </a:solidFill>
+              </a:rPr>
+              <a:t>지도</a:t>
+            </a:r>
+            <a:r>
+              <a:rPr lang="en-US" altLang="ko-KR" dirty="0">
+                <a:solidFill>
+                  <a:schemeClr val="tx1"/>
+                </a:solidFill>
+              </a:rPr>
+              <a:t>(</a:t>
+            </a:r>
+            <a:r>
+              <a:rPr lang="ko-KR" altLang="en-US" dirty="0">
+                <a:solidFill>
+                  <a:schemeClr val="tx1"/>
+                </a:solidFill>
+              </a:rPr>
+              <a:t>네이버</a:t>
+            </a:r>
+            <a:r>
+              <a:rPr lang="en-US" altLang="ko-KR" dirty="0">
+                <a:solidFill>
+                  <a:schemeClr val="tx1"/>
+                </a:solidFill>
+              </a:rPr>
+              <a:t>API)</a:t>
+            </a:r>
+            <a:endParaRPr lang="ko-KR" altLang="en-US" dirty="0">
+              <a:solidFill>
+                <a:schemeClr val="tx1"/>
+              </a:solidFill>
+            </a:endParaRPr>
+          </a:p>
+        </p:txBody>
+      </p:sp>
+      <p:sp>
+        <p:nvSpPr>
+          <p:cNvPr id="8" name="TextBox 7">
+            <a:extLst>
+              <a:ext uri="{FF2B5EF4-FFF2-40B4-BE49-F238E27FC236}">
+                <a16:creationId xmlns:a16="http://schemas.microsoft.com/office/drawing/2014/main" id="{0CB38910-2D81-46B5-A330-F341F7AFE4F8}"/>
+              </a:ext>
+            </a:extLst>
+          </p:cNvPr>
+          <p:cNvSpPr txBox="1"/>
+          <p:nvPr/>
+        </p:nvSpPr>
+        <p:spPr>
+          <a:xfrm>
+            <a:off x="5351271" y="2645555"/>
+            <a:ext cx="4748416" cy="923330"/>
+          </a:xfrm>
+          <a:prstGeom prst="rect">
+            <a:avLst/>
+          </a:prstGeom>
+          <a:noFill/>
+        </p:spPr>
+        <p:txBody>
+          <a:bodyPr wrap="none" rtlCol="0">
+            <a:spAutoFit/>
+          </a:bodyPr>
+          <a:lstStyle/>
+          <a:p>
+            <a:r>
+              <a:rPr lang="ko-KR" altLang="en-US" dirty="0"/>
+              <a:t>마트 정보를 미리 등록해두고 마트를 누르면</a:t>
+            </a:r>
+            <a:endParaRPr lang="en-US" altLang="ko-KR" dirty="0"/>
+          </a:p>
+          <a:p>
+            <a:r>
+              <a:rPr lang="ko-KR" altLang="en-US" dirty="0"/>
+              <a:t>해당 마트에서 파는 맥주목록을 띄우고</a:t>
+            </a:r>
+            <a:endParaRPr lang="en-US" altLang="ko-KR" dirty="0"/>
+          </a:p>
+          <a:p>
+            <a:r>
+              <a:rPr lang="ko-KR" altLang="en-US" dirty="0"/>
+              <a:t>추가 가능 하도록 해야함</a:t>
+            </a:r>
+            <a:r>
+              <a:rPr lang="en-US" altLang="ko-KR" dirty="0"/>
+              <a:t>.</a:t>
+            </a:r>
+          </a:p>
+        </p:txBody>
+      </p:sp>
+      <p:sp>
+        <p:nvSpPr>
+          <p:cNvPr id="12" name="직사각형 11">
+            <a:extLst>
+              <a:ext uri="{FF2B5EF4-FFF2-40B4-BE49-F238E27FC236}">
+                <a16:creationId xmlns:a16="http://schemas.microsoft.com/office/drawing/2014/main" id="{0D58AF93-0BA6-4C41-857E-6B4A3D205EC1}"/>
+              </a:ext>
+            </a:extLst>
+          </p:cNvPr>
+          <p:cNvSpPr/>
+          <p:nvPr/>
+        </p:nvSpPr>
+        <p:spPr>
+          <a:xfrm>
+            <a:off x="3106614" y="3675459"/>
+            <a:ext cx="1857272" cy="2014314"/>
+          </a:xfrm>
+          <a:prstGeom prst="rect">
+            <a:avLst/>
+          </a:prstGeom>
+          <a:noFill/>
+          <a:ln>
+            <a:solidFill>
+              <a:schemeClr val="tx1"/>
+            </a:solidFill>
+          </a:ln>
+        </p:spPr>
+        <p:style>
+          <a:lnRef idx="2">
+            <a:schemeClr val="accent1">
+              <a:shade val="50000"/>
+            </a:schemeClr>
+          </a:lnRef>
+          <a:fillRef idx="1">
+            <a:schemeClr val="accent1"/>
+          </a:fillRef>
+          <a:effectRef idx="0">
+            <a:schemeClr val="accent1"/>
+          </a:effectRef>
+          <a:fontRef idx="minor">
+            <a:schemeClr val="lt1"/>
+          </a:fontRef>
+        </p:style>
+        <p:txBody>
+          <a:bodyPr rtlCol="0" anchor="ctr"/>
+          <a:lstStyle/>
+          <a:p>
+            <a:pPr algn="ctr"/>
+            <a:endParaRPr lang="ko-KR" altLang="en-US" dirty="0">
+              <a:solidFill>
+                <a:schemeClr val="tx1"/>
+              </a:solidFill>
+            </a:endParaRPr>
+          </a:p>
+        </p:txBody>
+      </p:sp>
+      <p:sp>
+        <p:nvSpPr>
+          <p:cNvPr id="14" name="직사각형 13">
+            <a:extLst>
+              <a:ext uri="{FF2B5EF4-FFF2-40B4-BE49-F238E27FC236}">
+                <a16:creationId xmlns:a16="http://schemas.microsoft.com/office/drawing/2014/main" id="{2CE775AC-4485-4583-ADCD-0F07F3B34588}"/>
+              </a:ext>
+            </a:extLst>
+          </p:cNvPr>
+          <p:cNvSpPr/>
+          <p:nvPr/>
+        </p:nvSpPr>
+        <p:spPr>
+          <a:xfrm>
+            <a:off x="4474289" y="3769659"/>
+            <a:ext cx="388538" cy="354211"/>
+          </a:xfrm>
+          <a:prstGeom prst="rect">
+            <a:avLst/>
+          </a:prstGeom>
+          <a:noFill/>
+          <a:ln>
+            <a:solidFill>
+              <a:schemeClr val="tx1"/>
+            </a:solidFill>
+          </a:ln>
+        </p:spPr>
+        <p:style>
+          <a:lnRef idx="2">
+            <a:schemeClr val="accent1">
+              <a:shade val="50000"/>
+            </a:schemeClr>
+          </a:lnRef>
+          <a:fillRef idx="1">
+            <a:schemeClr val="accent1"/>
+          </a:fillRef>
+          <a:effectRef idx="0">
+            <a:schemeClr val="accent1"/>
+          </a:effectRef>
+          <a:fontRef idx="minor">
+            <a:schemeClr val="lt1"/>
+          </a:fontRef>
+        </p:style>
+        <p:txBody>
+          <a:bodyPr rtlCol="0" anchor="ctr"/>
+          <a:lstStyle/>
+          <a:p>
+            <a:pPr algn="ctr"/>
+            <a:r>
+              <a:rPr lang="en-US" altLang="ko-KR" dirty="0">
+                <a:solidFill>
+                  <a:schemeClr val="tx1"/>
+                </a:solidFill>
+              </a:rPr>
+              <a:t>+</a:t>
+            </a:r>
+            <a:endParaRPr lang="ko-KR" altLang="en-US" dirty="0">
+              <a:solidFill>
+                <a:schemeClr val="tx1"/>
+              </a:solidFill>
+            </a:endParaRPr>
+          </a:p>
+        </p:txBody>
+      </p:sp>
+      <p:sp>
+        <p:nvSpPr>
+          <p:cNvPr id="16" name="직사각형 15">
+            <a:extLst>
+              <a:ext uri="{FF2B5EF4-FFF2-40B4-BE49-F238E27FC236}">
+                <a16:creationId xmlns:a16="http://schemas.microsoft.com/office/drawing/2014/main" id="{2B82788E-D785-4E44-9096-D7683B048AB6}"/>
+              </a:ext>
+            </a:extLst>
+          </p:cNvPr>
+          <p:cNvSpPr/>
+          <p:nvPr/>
+        </p:nvSpPr>
+        <p:spPr>
+          <a:xfrm>
+            <a:off x="3300883" y="4280751"/>
+            <a:ext cx="1561944" cy="1256187"/>
+          </a:xfrm>
+          <a:prstGeom prst="rect">
+            <a:avLst/>
+          </a:prstGeom>
+          <a:noFill/>
+          <a:ln>
+            <a:solidFill>
+              <a:schemeClr val="tx1"/>
+            </a:solidFill>
+          </a:ln>
+        </p:spPr>
+        <p:style>
+          <a:lnRef idx="2">
+            <a:schemeClr val="accent1">
+              <a:shade val="50000"/>
+            </a:schemeClr>
+          </a:lnRef>
+          <a:fillRef idx="1">
+            <a:schemeClr val="accent1"/>
+          </a:fillRef>
+          <a:effectRef idx="0">
+            <a:schemeClr val="accent1"/>
+          </a:effectRef>
+          <a:fontRef idx="minor">
+            <a:schemeClr val="lt1"/>
+          </a:fontRef>
+        </p:style>
+        <p:txBody>
+          <a:bodyPr rtlCol="0" anchor="ctr"/>
+          <a:lstStyle/>
+          <a:p>
+            <a:pPr algn="ctr"/>
+            <a:r>
+              <a:rPr lang="ko-KR" altLang="en-US" dirty="0">
+                <a:solidFill>
+                  <a:schemeClr val="tx1"/>
+                </a:solidFill>
+              </a:rPr>
+              <a:t>해당 가게서 판매중인 맥주 리스트</a:t>
+            </a:r>
+          </a:p>
+        </p:txBody>
+      </p:sp>
+      <p:sp>
+        <p:nvSpPr>
+          <p:cNvPr id="17" name="직사각형 16">
+            <a:extLst>
+              <a:ext uri="{FF2B5EF4-FFF2-40B4-BE49-F238E27FC236}">
+                <a16:creationId xmlns:a16="http://schemas.microsoft.com/office/drawing/2014/main" id="{478549D5-909B-4B06-AE90-0999C314A64F}"/>
+              </a:ext>
+            </a:extLst>
+          </p:cNvPr>
+          <p:cNvSpPr/>
+          <p:nvPr/>
+        </p:nvSpPr>
+        <p:spPr>
+          <a:xfrm>
+            <a:off x="3157955" y="3777755"/>
+            <a:ext cx="1215275" cy="350162"/>
+          </a:xfrm>
+          <a:prstGeom prst="rect">
+            <a:avLst/>
+          </a:prstGeom>
+          <a:noFill/>
+          <a:ln>
+            <a:solidFill>
+              <a:schemeClr val="tx1"/>
+            </a:solidFill>
+          </a:ln>
+        </p:spPr>
+        <p:style>
+          <a:lnRef idx="2">
+            <a:schemeClr val="accent1">
+              <a:shade val="50000"/>
+            </a:schemeClr>
+          </a:lnRef>
+          <a:fillRef idx="1">
+            <a:schemeClr val="accent1"/>
+          </a:fillRef>
+          <a:effectRef idx="0">
+            <a:schemeClr val="accent1"/>
+          </a:effectRef>
+          <a:fontRef idx="minor">
+            <a:schemeClr val="lt1"/>
+          </a:fontRef>
+        </p:style>
+        <p:txBody>
+          <a:bodyPr rtlCol="0" anchor="ctr"/>
+          <a:lstStyle/>
+          <a:p>
+            <a:pPr algn="ctr"/>
+            <a:r>
+              <a:rPr lang="ko-KR" altLang="en-US" sz="1400" dirty="0">
+                <a:solidFill>
+                  <a:schemeClr val="tx1"/>
+                </a:solidFill>
+              </a:rPr>
+              <a:t>위치 상호명</a:t>
+            </a:r>
+          </a:p>
+        </p:txBody>
+      </p:sp>
+    </p:spTree>
+    <p:extLst>
+      <p:ext uri="{BB962C8B-B14F-4D97-AF65-F5344CB8AC3E}">
+        <p14:creationId xmlns:p14="http://schemas.microsoft.com/office/powerpoint/2010/main" val="1983502976"/>
+      </p:ext>
+    </p:extLst>
+  </p:cSld>
+  <p:clrMapOvr>
+    <a:masterClrMapping/>
+  </p:clrMapOvr>
+</p:sld>
+</file>
+
+<file path=ppt/slides/slide7.xml><?xml version="1.0" encoding="utf-8"?>
+<p:sld xmlns:a="http://schemas.openxmlformats.org/drawingml/2006/main" xmlns:r="http://schemas.openxmlformats.org/officeDocument/2006/relationships" xmlns:p="http://schemas.openxmlformats.org/presentationml/2006/main">
+  <p:cSld>
+    <p:spTree>
+      <p:nvGrpSpPr>
+        <p:cNvPr id="1" name=""/>
+        <p:cNvGrpSpPr/>
+        <p:nvPr/>
+      </p:nvGrpSpPr>
+      <p:grpSpPr>
+        <a:xfrm>
+          <a:off x="0" y="0"/>
+          <a:ext cx="0" cy="0"/>
+          <a:chOff x="0" y="0"/>
+          <a:chExt cx="0" cy="0"/>
+        </a:xfrm>
+      </p:grpSpPr>
+      <p:sp>
+        <p:nvSpPr>
+          <p:cNvPr id="4" name="TextBox 3">
+            <a:extLst>
+              <a:ext uri="{FF2B5EF4-FFF2-40B4-BE49-F238E27FC236}">
+                <a16:creationId xmlns:a16="http://schemas.microsoft.com/office/drawing/2014/main" id="{4EF497B9-4250-45CA-9310-F958047515F2}"/>
+              </a:ext>
+            </a:extLst>
+          </p:cNvPr>
+          <p:cNvSpPr txBox="1"/>
+          <p:nvPr/>
+        </p:nvSpPr>
+        <p:spPr>
+          <a:xfrm>
+            <a:off x="295275" y="200025"/>
+            <a:ext cx="7592681" cy="523220"/>
+          </a:xfrm>
+          <a:prstGeom prst="rect">
+            <a:avLst/>
+          </a:prstGeom>
+          <a:noFill/>
+        </p:spPr>
+        <p:txBody>
+          <a:bodyPr wrap="square" rtlCol="0">
+            <a:spAutoFit/>
+          </a:bodyPr>
+          <a:lstStyle/>
+          <a:p>
+            <a:r>
+              <a:rPr lang="ko-KR" altLang="en-US" sz="2800" dirty="0" err="1">
+                <a:latin typeface="+mj-lt"/>
+              </a:rPr>
+              <a:t>맥덕</a:t>
+            </a:r>
+            <a:r>
+              <a:rPr lang="en-US" altLang="ko-KR" sz="2800" dirty="0">
+                <a:latin typeface="+mj-lt"/>
+              </a:rPr>
+              <a:t>(</a:t>
+            </a:r>
+            <a:r>
+              <a:rPr lang="en-US" altLang="ko-KR" sz="2800" dirty="0"/>
+              <a:t>MAKDUCK</a:t>
+            </a:r>
+            <a:r>
+              <a:rPr lang="en-US" altLang="ko-KR" sz="2800" dirty="0">
+                <a:latin typeface="+mj-lt"/>
+              </a:rPr>
+              <a:t>) User-service APIs</a:t>
+            </a:r>
+            <a:endParaRPr lang="ko-KR" altLang="en-US" sz="2800" dirty="0">
+              <a:latin typeface="+mj-lt"/>
+            </a:endParaRPr>
+          </a:p>
+        </p:txBody>
+      </p:sp>
+      <p:graphicFrame>
+        <p:nvGraphicFramePr>
+          <p:cNvPr id="3" name="표 4">
+            <a:extLst>
+              <a:ext uri="{FF2B5EF4-FFF2-40B4-BE49-F238E27FC236}">
+                <a16:creationId xmlns:a16="http://schemas.microsoft.com/office/drawing/2014/main" id="{AF7C3BE1-5CA9-4345-A59E-2781B72BF9BB}"/>
+              </a:ext>
+            </a:extLst>
+          </p:cNvPr>
+          <p:cNvGraphicFramePr>
+            <a:graphicFrameLocks noGrp="1"/>
+          </p:cNvGraphicFramePr>
+          <p:nvPr>
+            <p:extLst>
+              <p:ext uri="{D42A27DB-BD31-4B8C-83A1-F6EECF244321}">
+                <p14:modId xmlns:p14="http://schemas.microsoft.com/office/powerpoint/2010/main" val="2864149280"/>
+              </p:ext>
+            </p:extLst>
+          </p:nvPr>
+        </p:nvGraphicFramePr>
+        <p:xfrm>
+          <a:off x="1296505" y="1862665"/>
+          <a:ext cx="9776778" cy="4327120"/>
+        </p:xfrm>
+        <a:graphic>
+          <a:graphicData uri="http://schemas.openxmlformats.org/drawingml/2006/table">
+            <a:tbl>
+              <a:tblPr firstRow="1" bandRow="1">
+                <a:tableStyleId>{073A0DAA-6AF3-43AB-8588-CEC1D06C72B9}</a:tableStyleId>
+              </a:tblPr>
+              <a:tblGrid>
+                <a:gridCol w="3258926">
+                  <a:extLst>
+                    <a:ext uri="{9D8B030D-6E8A-4147-A177-3AD203B41FA5}">
+                      <a16:colId xmlns:a16="http://schemas.microsoft.com/office/drawing/2014/main" val="285145472"/>
+                    </a:ext>
+                  </a:extLst>
+                </a:gridCol>
+                <a:gridCol w="3258926">
+                  <a:extLst>
+                    <a:ext uri="{9D8B030D-6E8A-4147-A177-3AD203B41FA5}">
+                      <a16:colId xmlns:a16="http://schemas.microsoft.com/office/drawing/2014/main" val="1762660863"/>
+                    </a:ext>
+                  </a:extLst>
+                </a:gridCol>
+                <a:gridCol w="3258926">
+                  <a:extLst>
+                    <a:ext uri="{9D8B030D-6E8A-4147-A177-3AD203B41FA5}">
+                      <a16:colId xmlns:a16="http://schemas.microsoft.com/office/drawing/2014/main" val="3516626433"/>
+                    </a:ext>
+                  </a:extLst>
+                </a:gridCol>
+              </a:tblGrid>
+              <a:tr h="540890">
+                <a:tc>
+                  <a:txBody>
+                    <a:bodyPr/>
+                    <a:lstStyle/>
+                    <a:p>
+                      <a:pPr latinLnBrk="1"/>
+                      <a:r>
+                        <a:rPr lang="en-US" altLang="ko-KR" dirty="0" err="1"/>
+                        <a:t>MicroService</a:t>
+                      </a:r>
+                      <a:endParaRPr lang="ko-KR" altLang="en-US" dirty="0"/>
+                    </a:p>
+                  </a:txBody>
+                  <a:tcPr/>
+                </a:tc>
+                <a:tc>
+                  <a:txBody>
+                    <a:bodyPr/>
+                    <a:lstStyle/>
+                    <a:p>
+                      <a:pPr latinLnBrk="1"/>
+                      <a:r>
+                        <a:rPr lang="en-US" altLang="ko-KR" dirty="0"/>
+                        <a:t>RESTful API</a:t>
+                      </a:r>
+                      <a:endParaRPr lang="ko-KR" altLang="en-US" dirty="0"/>
+                    </a:p>
+                  </a:txBody>
+                  <a:tcPr/>
+                </a:tc>
+                <a:tc>
+                  <a:txBody>
+                    <a:bodyPr/>
+                    <a:lstStyle/>
+                    <a:p>
+                      <a:pPr latinLnBrk="1"/>
+                      <a:r>
+                        <a:rPr lang="en-US" altLang="ko-KR" dirty="0"/>
+                        <a:t>HTTP Method</a:t>
+                      </a:r>
+                      <a:endParaRPr lang="ko-KR" altLang="en-US" dirty="0"/>
+                    </a:p>
+                  </a:txBody>
+                  <a:tcPr/>
+                </a:tc>
+                <a:extLst>
+                  <a:ext uri="{0D108BD9-81ED-4DB2-BD59-A6C34878D82A}">
+                    <a16:rowId xmlns:a16="http://schemas.microsoft.com/office/drawing/2014/main" val="2432093418"/>
+                  </a:ext>
+                </a:extLst>
+              </a:tr>
+              <a:tr h="540890">
+                <a:tc>
+                  <a:txBody>
+                    <a:bodyPr/>
+                    <a:lstStyle/>
+                    <a:p>
+                      <a:pPr latinLnBrk="1"/>
+                      <a:r>
+                        <a:rPr lang="en-US" altLang="ko-KR" dirty="0"/>
+                        <a:t>User-service</a:t>
+                      </a:r>
+                      <a:endParaRPr lang="ko-KR" altLang="en-US" dirty="0"/>
+                    </a:p>
+                  </a:txBody>
+                  <a:tcPr/>
+                </a:tc>
+                <a:tc>
+                  <a:txBody>
+                    <a:bodyPr/>
+                    <a:lstStyle/>
+                    <a:p>
+                      <a:pPr latinLnBrk="1"/>
+                      <a:r>
+                        <a:rPr lang="en-US" altLang="ko-KR" dirty="0"/>
+                        <a:t>/user-service/join</a:t>
+                      </a:r>
+                      <a:endParaRPr lang="ko-KR" altLang="en-US" dirty="0"/>
+                    </a:p>
+                  </a:txBody>
+                  <a:tcPr/>
+                </a:tc>
+                <a:tc>
+                  <a:txBody>
+                    <a:bodyPr/>
+                    <a:lstStyle/>
+                    <a:p>
+                      <a:pPr latinLnBrk="1"/>
+                      <a:r>
+                        <a:rPr lang="en-US" altLang="ko-KR" dirty="0"/>
+                        <a:t>Post</a:t>
+                      </a:r>
+                      <a:endParaRPr lang="ko-KR" altLang="en-US" dirty="0"/>
+                    </a:p>
+                  </a:txBody>
+                  <a:tcPr/>
+                </a:tc>
+                <a:extLst>
+                  <a:ext uri="{0D108BD9-81ED-4DB2-BD59-A6C34878D82A}">
+                    <a16:rowId xmlns:a16="http://schemas.microsoft.com/office/drawing/2014/main" val="3129360945"/>
+                  </a:ext>
+                </a:extLst>
+              </a:tr>
+              <a:tr h="540890">
+                <a:tc>
+                  <a:txBody>
+                    <a:bodyPr/>
+                    <a:lstStyle/>
+                    <a:p>
+                      <a:pPr latinLnBrk="1"/>
+                      <a:endParaRPr lang="ko-KR" altLang="en-US" dirty="0"/>
+                    </a:p>
+                  </a:txBody>
+                  <a:tcPr/>
+                </a:tc>
+                <a:tc>
+                  <a:txBody>
+                    <a:bodyPr/>
+                    <a:lstStyle/>
+                    <a:p>
+                      <a:pPr latinLnBrk="1"/>
+                      <a:r>
+                        <a:rPr lang="en-US" altLang="ko-KR" dirty="0"/>
+                        <a:t>/user-service/login</a:t>
+                      </a:r>
+                      <a:endParaRPr lang="ko-KR" altLang="en-US" dirty="0"/>
+                    </a:p>
+                  </a:txBody>
+                  <a:tcPr/>
+                </a:tc>
+                <a:tc>
+                  <a:txBody>
+                    <a:bodyPr/>
+                    <a:lstStyle/>
+                    <a:p>
+                      <a:pPr latinLnBrk="1"/>
+                      <a:r>
+                        <a:rPr lang="en-US" altLang="ko-KR" dirty="0"/>
+                        <a:t>Get</a:t>
+                      </a:r>
+                      <a:endParaRPr lang="ko-KR" altLang="en-US" dirty="0"/>
+                    </a:p>
+                  </a:txBody>
+                  <a:tcPr/>
+                </a:tc>
+                <a:extLst>
+                  <a:ext uri="{0D108BD9-81ED-4DB2-BD59-A6C34878D82A}">
+                    <a16:rowId xmlns:a16="http://schemas.microsoft.com/office/drawing/2014/main" val="3126172474"/>
+                  </a:ext>
+                </a:extLst>
+              </a:tr>
+              <a:tr h="540890">
+                <a:tc>
+                  <a:txBody>
+                    <a:bodyPr/>
+                    <a:lstStyle/>
+                    <a:p>
+                      <a:pPr latinLnBrk="1"/>
+                      <a:endParaRPr lang="ko-KR" altLang="en-US" dirty="0"/>
+                    </a:p>
+                  </a:txBody>
+                  <a:tcPr/>
+                </a:tc>
+                <a:tc>
+                  <a:txBody>
+                    <a:bodyPr/>
+                    <a:lstStyle/>
+                    <a:p>
+                      <a:pPr latinLnBrk="1"/>
+                      <a:r>
+                        <a:rPr lang="en-US" altLang="ko-KR" dirty="0"/>
+                        <a:t>/user-service/users/{</a:t>
+                      </a:r>
+                      <a:r>
+                        <a:rPr lang="en-US" altLang="ko-KR" dirty="0" err="1"/>
+                        <a:t>user_id</a:t>
+                      </a:r>
+                      <a:r>
+                        <a:rPr lang="en-US" altLang="ko-KR" dirty="0"/>
+                        <a:t>}</a:t>
+                      </a:r>
+                      <a:endParaRPr lang="ko-KR" altLang="en-US" dirty="0"/>
+                    </a:p>
+                  </a:txBody>
+                  <a:tcPr/>
+                </a:tc>
+                <a:tc>
+                  <a:txBody>
+                    <a:bodyPr/>
+                    <a:lstStyle/>
+                    <a:p>
+                      <a:pPr latinLnBrk="1"/>
+                      <a:endParaRPr lang="ko-KR" altLang="en-US" dirty="0"/>
+                    </a:p>
+                  </a:txBody>
+                  <a:tcPr/>
+                </a:tc>
+                <a:extLst>
+                  <a:ext uri="{0D108BD9-81ED-4DB2-BD59-A6C34878D82A}">
+                    <a16:rowId xmlns:a16="http://schemas.microsoft.com/office/drawing/2014/main" val="2439666365"/>
+                  </a:ext>
+                </a:extLst>
+              </a:tr>
+              <a:tr h="540890">
+                <a:tc>
+                  <a:txBody>
+                    <a:bodyPr/>
+                    <a:lstStyle/>
+                    <a:p>
+                      <a:pPr latinLnBrk="1"/>
+                      <a:endParaRPr lang="ko-KR" altLang="en-US" dirty="0"/>
+                    </a:p>
+                  </a:txBody>
+                  <a:tcPr/>
+                </a:tc>
+                <a:tc>
+                  <a:txBody>
+                    <a:bodyPr/>
+                    <a:lstStyle/>
+                    <a:p>
+                      <a:pPr latinLnBrk="1"/>
+                      <a:r>
+                        <a:rPr lang="en-US" altLang="ko-KR" dirty="0"/>
+                        <a:t>/user-service/</a:t>
+                      </a:r>
+                      <a:endParaRPr lang="ko-KR" altLang="en-US" dirty="0"/>
+                    </a:p>
+                  </a:txBody>
+                  <a:tcPr/>
+                </a:tc>
+                <a:tc>
+                  <a:txBody>
+                    <a:bodyPr/>
+                    <a:lstStyle/>
+                    <a:p>
+                      <a:pPr latinLnBrk="1"/>
+                      <a:endParaRPr lang="ko-KR" altLang="en-US" dirty="0"/>
+                    </a:p>
+                  </a:txBody>
+                  <a:tcPr/>
+                </a:tc>
+                <a:extLst>
+                  <a:ext uri="{0D108BD9-81ED-4DB2-BD59-A6C34878D82A}">
+                    <a16:rowId xmlns:a16="http://schemas.microsoft.com/office/drawing/2014/main" val="2393925559"/>
+                  </a:ext>
+                </a:extLst>
+              </a:tr>
+              <a:tr h="540890">
+                <a:tc>
+                  <a:txBody>
+                    <a:bodyPr/>
+                    <a:lstStyle/>
+                    <a:p>
+                      <a:pPr latinLnBrk="1"/>
+                      <a:endParaRPr lang="ko-KR" altLang="en-US" dirty="0"/>
+                    </a:p>
+                  </a:txBody>
+                  <a:tcPr/>
+                </a:tc>
+                <a:tc>
+                  <a:txBody>
+                    <a:bodyPr/>
+                    <a:lstStyle/>
+                    <a:p>
+                      <a:pPr latinLnBrk="1"/>
+                      <a:endParaRPr lang="ko-KR" altLang="en-US" dirty="0"/>
+                    </a:p>
+                  </a:txBody>
+                  <a:tcPr/>
+                </a:tc>
+                <a:tc>
+                  <a:txBody>
+                    <a:bodyPr/>
+                    <a:lstStyle/>
+                    <a:p>
+                      <a:pPr latinLnBrk="1"/>
+                      <a:endParaRPr lang="ko-KR" altLang="en-US" dirty="0"/>
+                    </a:p>
+                  </a:txBody>
+                  <a:tcPr/>
+                </a:tc>
+                <a:extLst>
+                  <a:ext uri="{0D108BD9-81ED-4DB2-BD59-A6C34878D82A}">
+                    <a16:rowId xmlns:a16="http://schemas.microsoft.com/office/drawing/2014/main" val="1089589800"/>
+                  </a:ext>
+                </a:extLst>
+              </a:tr>
+              <a:tr h="540890">
+                <a:tc>
+                  <a:txBody>
+                    <a:bodyPr/>
+                    <a:lstStyle/>
+                    <a:p>
+                      <a:pPr latinLnBrk="1"/>
+                      <a:endParaRPr lang="ko-KR" altLang="en-US" dirty="0"/>
+                    </a:p>
+                  </a:txBody>
+                  <a:tcPr/>
+                </a:tc>
+                <a:tc>
+                  <a:txBody>
+                    <a:bodyPr/>
+                    <a:lstStyle/>
+                    <a:p>
+                      <a:pPr latinLnBrk="1"/>
+                      <a:endParaRPr lang="ko-KR" altLang="en-US"/>
+                    </a:p>
+                  </a:txBody>
+                  <a:tcPr/>
+                </a:tc>
+                <a:tc>
+                  <a:txBody>
+                    <a:bodyPr/>
+                    <a:lstStyle/>
+                    <a:p>
+                      <a:pPr latinLnBrk="1"/>
+                      <a:endParaRPr lang="ko-KR" altLang="en-US"/>
+                    </a:p>
+                  </a:txBody>
+                  <a:tcPr/>
+                </a:tc>
+                <a:extLst>
+                  <a:ext uri="{0D108BD9-81ED-4DB2-BD59-A6C34878D82A}">
+                    <a16:rowId xmlns:a16="http://schemas.microsoft.com/office/drawing/2014/main" val="715425833"/>
+                  </a:ext>
+                </a:extLst>
+              </a:tr>
+              <a:tr h="540890">
+                <a:tc>
+                  <a:txBody>
+                    <a:bodyPr/>
+                    <a:lstStyle/>
+                    <a:p>
+                      <a:pPr latinLnBrk="1"/>
+                      <a:endParaRPr lang="ko-KR" altLang="en-US"/>
+                    </a:p>
+                  </a:txBody>
+                  <a:tcPr/>
+                </a:tc>
+                <a:tc>
+                  <a:txBody>
+                    <a:bodyPr/>
+                    <a:lstStyle/>
+                    <a:p>
+                      <a:pPr latinLnBrk="1"/>
+                      <a:endParaRPr lang="ko-KR" altLang="en-US"/>
+                    </a:p>
+                  </a:txBody>
+                  <a:tcPr/>
+                </a:tc>
+                <a:tc>
+                  <a:txBody>
+                    <a:bodyPr/>
+                    <a:lstStyle/>
+                    <a:p>
+                      <a:pPr latinLnBrk="1"/>
+                      <a:endParaRPr lang="ko-KR" altLang="en-US" dirty="0"/>
+                    </a:p>
+                  </a:txBody>
+                  <a:tcPr/>
+                </a:tc>
+                <a:extLst>
+                  <a:ext uri="{0D108BD9-81ED-4DB2-BD59-A6C34878D82A}">
+                    <a16:rowId xmlns:a16="http://schemas.microsoft.com/office/drawing/2014/main" val="851339124"/>
+                  </a:ext>
+                </a:extLst>
+              </a:tr>
+            </a:tbl>
+          </a:graphicData>
+        </a:graphic>
+      </p:graphicFrame>
+    </p:spTree>
+    <p:extLst>
+      <p:ext uri="{BB962C8B-B14F-4D97-AF65-F5344CB8AC3E}">
+        <p14:creationId xmlns:p14="http://schemas.microsoft.com/office/powerpoint/2010/main" val="1209150263"/>
+      </p:ext>
+    </p:extLst>
+  </p:cSld>
+  <p:clrMapOvr>
+    <a:masterClrMapping/>
+  </p:clrMapOvr>
+</p:sld>
+</file>
+
 <file path=ppt/theme/theme1.xml><?xml version="1.0" encoding="utf-8"?>
 <a:theme xmlns:a="http://schemas.openxmlformats.org/drawingml/2006/main" name="Office 테마">
   <a:themeElements>

</xml_diff>